<commit_message>
Change design of presentation
</commit_message>
<xml_diff>
--- a/Image Compression with Neural Networks.pptx
+++ b/Image Compression with Neural Networks.pptx
@@ -2,7 +2,7 @@
 <file path=ppt/presentation.xml><?xml version="1.0" encoding="utf-8"?>
 <p:presentation xmlns:a="http://schemas.openxmlformats.org/drawingml/2006/main" xmlns:r="http://schemas.openxmlformats.org/officeDocument/2006/relationships" xmlns:p="http://schemas.openxmlformats.org/presentationml/2006/main" saveSubsetFonts="1">
   <p:sldMasterIdLst>
-    <p:sldMasterId id="2147483648" r:id="rId1"/>
+    <p:sldMasterId id="2147483690" r:id="rId1"/>
   </p:sldMasterIdLst>
   <p:sldIdLst>
     <p:sldId id="256" r:id="rId2"/>
@@ -25,9 +25,9 @@
   <p:notesSz cx="6858000" cy="9144000"/>
   <p:defaultTextStyle>
     <a:defPPr>
-      <a:defRPr lang="ru-RU"/>
+      <a:defRPr lang="en-US"/>
     </a:defPPr>
-    <a:lvl1pPr marL="0" algn="l" defTabSz="914400" rtl="0" eaLnBrk="1" latinLnBrk="0" hangingPunct="1">
+    <a:lvl1pPr marL="0" algn="l" defTabSz="457200" rtl="0" eaLnBrk="1" latinLnBrk="0" hangingPunct="1">
       <a:defRPr sz="1800" kern="1200">
         <a:solidFill>
           <a:schemeClr val="tx1"/>
@@ -37,7 +37,7 @@
         <a:cs typeface="+mn-cs"/>
       </a:defRPr>
     </a:lvl1pPr>
-    <a:lvl2pPr marL="457200" algn="l" defTabSz="914400" rtl="0" eaLnBrk="1" latinLnBrk="0" hangingPunct="1">
+    <a:lvl2pPr marL="457200" algn="l" defTabSz="457200" rtl="0" eaLnBrk="1" latinLnBrk="0" hangingPunct="1">
       <a:defRPr sz="1800" kern="1200">
         <a:solidFill>
           <a:schemeClr val="tx1"/>
@@ -47,7 +47,7 @@
         <a:cs typeface="+mn-cs"/>
       </a:defRPr>
     </a:lvl2pPr>
-    <a:lvl3pPr marL="914400" algn="l" defTabSz="914400" rtl="0" eaLnBrk="1" latinLnBrk="0" hangingPunct="1">
+    <a:lvl3pPr marL="914400" algn="l" defTabSz="457200" rtl="0" eaLnBrk="1" latinLnBrk="0" hangingPunct="1">
       <a:defRPr sz="1800" kern="1200">
         <a:solidFill>
           <a:schemeClr val="tx1"/>
@@ -57,7 +57,7 @@
         <a:cs typeface="+mn-cs"/>
       </a:defRPr>
     </a:lvl3pPr>
-    <a:lvl4pPr marL="1371600" algn="l" defTabSz="914400" rtl="0" eaLnBrk="1" latinLnBrk="0" hangingPunct="1">
+    <a:lvl4pPr marL="1371600" algn="l" defTabSz="457200" rtl="0" eaLnBrk="1" latinLnBrk="0" hangingPunct="1">
       <a:defRPr sz="1800" kern="1200">
         <a:solidFill>
           <a:schemeClr val="tx1"/>
@@ -67,7 +67,7 @@
         <a:cs typeface="+mn-cs"/>
       </a:defRPr>
     </a:lvl4pPr>
-    <a:lvl5pPr marL="1828800" algn="l" defTabSz="914400" rtl="0" eaLnBrk="1" latinLnBrk="0" hangingPunct="1">
+    <a:lvl5pPr marL="1828800" algn="l" defTabSz="457200" rtl="0" eaLnBrk="1" latinLnBrk="0" hangingPunct="1">
       <a:defRPr sz="1800" kern="1200">
         <a:solidFill>
           <a:schemeClr val="tx1"/>
@@ -77,7 +77,7 @@
         <a:cs typeface="+mn-cs"/>
       </a:defRPr>
     </a:lvl5pPr>
-    <a:lvl6pPr marL="2286000" algn="l" defTabSz="914400" rtl="0" eaLnBrk="1" latinLnBrk="0" hangingPunct="1">
+    <a:lvl6pPr marL="2286000" algn="l" defTabSz="457200" rtl="0" eaLnBrk="1" latinLnBrk="0" hangingPunct="1">
       <a:defRPr sz="1800" kern="1200">
         <a:solidFill>
           <a:schemeClr val="tx1"/>
@@ -87,7 +87,7 @@
         <a:cs typeface="+mn-cs"/>
       </a:defRPr>
     </a:lvl6pPr>
-    <a:lvl7pPr marL="2743200" algn="l" defTabSz="914400" rtl="0" eaLnBrk="1" latinLnBrk="0" hangingPunct="1">
+    <a:lvl7pPr marL="2743200" algn="l" defTabSz="457200" rtl="0" eaLnBrk="1" latinLnBrk="0" hangingPunct="1">
       <a:defRPr sz="1800" kern="1200">
         <a:solidFill>
           <a:schemeClr val="tx1"/>
@@ -97,7 +97,7 @@
         <a:cs typeface="+mn-cs"/>
       </a:defRPr>
     </a:lvl7pPr>
-    <a:lvl8pPr marL="3200400" algn="l" defTabSz="914400" rtl="0" eaLnBrk="1" latinLnBrk="0" hangingPunct="1">
+    <a:lvl8pPr marL="3200400" algn="l" defTabSz="457200" rtl="0" eaLnBrk="1" latinLnBrk="0" hangingPunct="1">
       <a:defRPr sz="1800" kern="1200">
         <a:solidFill>
           <a:schemeClr val="tx1"/>
@@ -107,7 +107,7 @@
         <a:cs typeface="+mn-cs"/>
       </a:defRPr>
     </a:lvl8pPr>
-    <a:lvl9pPr marL="3657600" algn="l" defTabSz="914400" rtl="0" eaLnBrk="1" latinLnBrk="0" hangingPunct="1">
+    <a:lvl9pPr marL="3657600" algn="l" defTabSz="457200" rtl="0" eaLnBrk="1" latinLnBrk="0" hangingPunct="1">
       <a:defRPr sz="1800" kern="1200">
         <a:solidFill>
           <a:schemeClr val="tx1"/>
@@ -140,6 +140,14 @@
 <file path=ppt/slideLayouts/slideLayout1.xml><?xml version="1.0" encoding="utf-8"?>
 <p:sldLayout xmlns:a="http://schemas.openxmlformats.org/drawingml/2006/main" xmlns:r="http://schemas.openxmlformats.org/officeDocument/2006/relationships" xmlns:p="http://schemas.openxmlformats.org/presentationml/2006/main" type="title" preserve="1">
   <p:cSld name="Титульный слайд">
+    <p:bg>
+      <p:bgPr>
+        <a:solidFill>
+          <a:schemeClr val="accent1"/>
+        </a:solidFill>
+        <a:effectLst/>
+      </p:bgPr>
+    </p:bg>
     <p:spTree>
       <p:nvGrpSpPr>
         <p:cNvPr id="1" name=""/>
@@ -156,207 +164,238 @@
       </p:grpSpPr>
       <p:sp>
         <p:nvSpPr>
-          <p:cNvPr id="2" name="Заголовок 1"/>
-          <p:cNvSpPr>
-            <a:spLocks noGrp="1"/>
-          </p:cNvSpPr>
-          <p:nvPr>
-            <p:ph type="ctrTitle"/>
-          </p:nvPr>
+          <p:cNvPr id="4" name="Rectangle 3"/>
+          <p:cNvSpPr/>
+          <p:nvPr/>
         </p:nvSpPr>
         <p:spPr>
           <a:xfrm>
-            <a:off x="685800" y="2130425"/>
-            <a:ext cx="7772400" cy="1470025"/>
+            <a:off x="0" y="0"/>
+            <a:ext cx="9144000" cy="6858000"/>
+          </a:xfrm>
+          <a:prstGeom prst="rect">
+            <a:avLst/>
+          </a:prstGeom>
+          <a:ln>
+            <a:noFill/>
+          </a:ln>
+        </p:spPr>
+        <p:style>
+          <a:lnRef idx="2">
+            <a:schemeClr val="accent1">
+              <a:shade val="50000"/>
+            </a:schemeClr>
+          </a:lnRef>
+          <a:fillRef idx="1">
+            <a:schemeClr val="accent1"/>
+          </a:fillRef>
+          <a:effectRef idx="0">
+            <a:schemeClr val="accent1"/>
+          </a:effectRef>
+          <a:fontRef idx="minor">
+            <a:schemeClr val="lt1"/>
+          </a:fontRef>
+        </p:style>
+      </p:sp>
+      <p:sp>
+        <p:nvSpPr>
+          <p:cNvPr id="2" name="Title 1"/>
+          <p:cNvSpPr>
+            <a:spLocks noGrp="1"/>
+          </p:cNvSpPr>
+          <p:nvPr>
+            <p:ph type="ctrTitle"/>
+          </p:nvPr>
+        </p:nvSpPr>
+        <p:spPr>
+          <a:xfrm>
+            <a:off x="452628" y="770467"/>
+            <a:ext cx="8086725" cy="3352800"/>
           </a:xfrm>
         </p:spPr>
         <p:txBody>
-          <a:bodyPr/>
-          <a:lstStyle/>
-          <a:p>
-            <a:r>
-              <a:rPr lang="ru-RU" smtClean="0"/>
-              <a:t>Образец заголовка</a:t>
-            </a:r>
-            <a:endParaRPr lang="ru-RU"/>
-          </a:p>
-        </p:txBody>
-      </p:sp>
-      <p:sp>
-        <p:nvSpPr>
-          <p:cNvPr id="3" name="Подзаголовок 2"/>
-          <p:cNvSpPr>
-            <a:spLocks noGrp="1"/>
-          </p:cNvSpPr>
-          <p:nvPr>
-            <p:ph type="subTitle" idx="1"/>
-          </p:nvPr>
-        </p:nvSpPr>
-        <p:spPr>
-          <a:xfrm>
-            <a:off x="1371600" y="3886200"/>
-            <a:ext cx="6400800" cy="1752600"/>
-          </a:xfrm>
-        </p:spPr>
-        <p:txBody>
-          <a:bodyPr/>
+          <a:bodyPr anchor="b">
+            <a:noAutofit/>
+          </a:bodyPr>
           <a:lstStyle>
-            <a:lvl1pPr marL="0" indent="0" algn="ctr">
-              <a:buNone/>
-              <a:defRPr>
+            <a:lvl1pPr algn="l">
+              <a:lnSpc>
+                <a:spcPct val="80000"/>
+              </a:lnSpc>
+              <a:defRPr sz="8000" spc="-120" baseline="0">
                 <a:solidFill>
-                  <a:schemeClr val="tx1">
-                    <a:tint val="75000"/>
-                  </a:schemeClr>
+                  <a:srgbClr val="FFFFFF"/>
                 </a:solidFill>
               </a:defRPr>
             </a:lvl1pPr>
+          </a:lstStyle>
+          <a:p>
+            <a:r>
+              <a:rPr lang="ru-RU" smtClean="0"/>
+              <a:t>Образец заголовка</a:t>
+            </a:r>
+            <a:endParaRPr lang="en-US" dirty="0"/>
+          </a:p>
+        </p:txBody>
+      </p:sp>
+      <p:sp>
+        <p:nvSpPr>
+          <p:cNvPr id="3" name="Subtitle 2"/>
+          <p:cNvSpPr>
+            <a:spLocks noGrp="1"/>
+          </p:cNvSpPr>
+          <p:nvPr>
+            <p:ph type="subTitle" idx="1"/>
+          </p:nvPr>
+        </p:nvSpPr>
+        <p:spPr>
+          <a:xfrm>
+            <a:off x="500634" y="4198409"/>
+            <a:ext cx="6921151" cy="1645920"/>
+          </a:xfrm>
+        </p:spPr>
+        <p:txBody>
+          <a:bodyPr>
+            <a:normAutofit/>
+          </a:bodyPr>
+          <a:lstStyle>
+            <a:lvl1pPr marL="0" indent="0" algn="l">
+              <a:buNone/>
+              <a:defRPr sz="2800">
+                <a:solidFill>
+                  <a:schemeClr val="bg1"/>
+                </a:solidFill>
+                <a:latin typeface="+mj-lt"/>
+              </a:defRPr>
+            </a:lvl1pPr>
             <a:lvl2pPr marL="457200" indent="0" algn="ctr">
               <a:buNone/>
+              <a:defRPr sz="2800"/>
+            </a:lvl2pPr>
+            <a:lvl3pPr marL="914400" indent="0" algn="ctr">
+              <a:buNone/>
+              <a:defRPr sz="2400"/>
+            </a:lvl3pPr>
+            <a:lvl4pPr marL="1371600" indent="0" algn="ctr">
+              <a:buNone/>
+              <a:defRPr sz="2000"/>
+            </a:lvl4pPr>
+            <a:lvl5pPr marL="1828800" indent="0" algn="ctr">
+              <a:buNone/>
+              <a:defRPr sz="2000"/>
+            </a:lvl5pPr>
+            <a:lvl6pPr marL="2286000" indent="0" algn="ctr">
+              <a:buNone/>
+              <a:defRPr sz="2000"/>
+            </a:lvl6pPr>
+            <a:lvl7pPr marL="2743200" indent="0" algn="ctr">
+              <a:buNone/>
+              <a:defRPr sz="2000"/>
+            </a:lvl7pPr>
+            <a:lvl8pPr marL="3200400" indent="0" algn="ctr">
+              <a:buNone/>
+              <a:defRPr sz="2000"/>
+            </a:lvl8pPr>
+            <a:lvl9pPr marL="3657600" indent="0" algn="ctr">
+              <a:buNone/>
+              <a:defRPr sz="2000"/>
+            </a:lvl9pPr>
+          </a:lstStyle>
+          <a:p>
+            <a:r>
+              <a:rPr lang="ru-RU" smtClean="0"/>
+              <a:t>Образец подзаголовка</a:t>
+            </a:r>
+            <a:endParaRPr lang="en-US" dirty="0"/>
+          </a:p>
+        </p:txBody>
+      </p:sp>
+      <p:sp>
+        <p:nvSpPr>
+          <p:cNvPr id="7" name="Date Placeholder 6"/>
+          <p:cNvSpPr>
+            <a:spLocks noGrp="1"/>
+          </p:cNvSpPr>
+          <p:nvPr>
+            <p:ph type="dt" sz="half" idx="10"/>
+          </p:nvPr>
+        </p:nvSpPr>
+        <p:spPr/>
+        <p:txBody>
+          <a:bodyPr/>
+          <a:lstStyle>
+            <a:lvl1pPr>
               <a:defRPr>
                 <a:solidFill>
-                  <a:schemeClr val="tx1">
-                    <a:tint val="75000"/>
-                  </a:schemeClr>
+                  <a:srgbClr val="FFFFFF">
+                    <a:alpha val="75000"/>
+                  </a:srgbClr>
                 </a:solidFill>
               </a:defRPr>
-            </a:lvl2pPr>
-            <a:lvl3pPr marL="914400" indent="0" algn="ctr">
-              <a:buNone/>
+            </a:lvl1pPr>
+          </a:lstStyle>
+          <a:p>
+            <a:fld id="{81F02B84-2724-4998-9FA1-23616E67724A}" type="datetimeFigureOut">
+              <a:rPr lang="ru-RU" smtClean="0"/>
+              <a:t>19.10.2016</a:t>
+            </a:fld>
+            <a:endParaRPr lang="ru-RU"/>
+          </a:p>
+        </p:txBody>
+      </p:sp>
+      <p:sp>
+        <p:nvSpPr>
+          <p:cNvPr id="8" name="Footer Placeholder 7"/>
+          <p:cNvSpPr>
+            <a:spLocks noGrp="1"/>
+          </p:cNvSpPr>
+          <p:nvPr>
+            <p:ph type="ftr" sz="quarter" idx="11"/>
+          </p:nvPr>
+        </p:nvSpPr>
+        <p:spPr/>
+        <p:txBody>
+          <a:bodyPr/>
+          <a:lstStyle>
+            <a:lvl1pPr>
               <a:defRPr>
                 <a:solidFill>
-                  <a:schemeClr val="tx1">
-                    <a:tint val="75000"/>
-                  </a:schemeClr>
+                  <a:srgbClr val="FFFFFF">
+                    <a:alpha val="75000"/>
+                  </a:srgbClr>
                 </a:solidFill>
               </a:defRPr>
-            </a:lvl3pPr>
-            <a:lvl4pPr marL="1371600" indent="0" algn="ctr">
-              <a:buNone/>
+            </a:lvl1pPr>
+          </a:lstStyle>
+          <a:p>
+            <a:endParaRPr lang="ru-RU"/>
+          </a:p>
+        </p:txBody>
+      </p:sp>
+      <p:sp>
+        <p:nvSpPr>
+          <p:cNvPr id="9" name="Slide Number Placeholder 8"/>
+          <p:cNvSpPr>
+            <a:spLocks noGrp="1"/>
+          </p:cNvSpPr>
+          <p:nvPr>
+            <p:ph type="sldNum" sz="quarter" idx="12"/>
+          </p:nvPr>
+        </p:nvSpPr>
+        <p:spPr/>
+        <p:txBody>
+          <a:bodyPr/>
+          <a:lstStyle>
+            <a:lvl1pPr>
               <a:defRPr>
                 <a:solidFill>
-                  <a:schemeClr val="tx1">
-                    <a:tint val="75000"/>
-                  </a:schemeClr>
+                  <a:srgbClr val="FFFFFF">
+                    <a:alpha val="20000"/>
+                  </a:srgbClr>
                 </a:solidFill>
               </a:defRPr>
-            </a:lvl4pPr>
-            <a:lvl5pPr marL="1828800" indent="0" algn="ctr">
-              <a:buNone/>
-              <a:defRPr>
-                <a:solidFill>
-                  <a:schemeClr val="tx1">
-                    <a:tint val="75000"/>
-                  </a:schemeClr>
-                </a:solidFill>
-              </a:defRPr>
-            </a:lvl5pPr>
-            <a:lvl6pPr marL="2286000" indent="0" algn="ctr">
-              <a:buNone/>
-              <a:defRPr>
-                <a:solidFill>
-                  <a:schemeClr val="tx1">
-                    <a:tint val="75000"/>
-                  </a:schemeClr>
-                </a:solidFill>
-              </a:defRPr>
-            </a:lvl6pPr>
-            <a:lvl7pPr marL="2743200" indent="0" algn="ctr">
-              <a:buNone/>
-              <a:defRPr>
-                <a:solidFill>
-                  <a:schemeClr val="tx1">
-                    <a:tint val="75000"/>
-                  </a:schemeClr>
-                </a:solidFill>
-              </a:defRPr>
-            </a:lvl7pPr>
-            <a:lvl8pPr marL="3200400" indent="0" algn="ctr">
-              <a:buNone/>
-              <a:defRPr>
-                <a:solidFill>
-                  <a:schemeClr val="tx1">
-                    <a:tint val="75000"/>
-                  </a:schemeClr>
-                </a:solidFill>
-              </a:defRPr>
-            </a:lvl8pPr>
-            <a:lvl9pPr marL="3657600" indent="0" algn="ctr">
-              <a:buNone/>
-              <a:defRPr>
-                <a:solidFill>
-                  <a:schemeClr val="tx1">
-                    <a:tint val="75000"/>
-                  </a:schemeClr>
-                </a:solidFill>
-              </a:defRPr>
-            </a:lvl9pPr>
+            </a:lvl1pPr>
           </a:lstStyle>
-          <a:p>
-            <a:r>
-              <a:rPr lang="ru-RU" smtClean="0"/>
-              <a:t>Образец подзаголовка</a:t>
-            </a:r>
-            <a:endParaRPr lang="ru-RU"/>
-          </a:p>
-        </p:txBody>
-      </p:sp>
-      <p:sp>
-        <p:nvSpPr>
-          <p:cNvPr id="4" name="Дата 3"/>
-          <p:cNvSpPr>
-            <a:spLocks noGrp="1"/>
-          </p:cNvSpPr>
-          <p:nvPr>
-            <p:ph type="dt" sz="half" idx="10"/>
-          </p:nvPr>
-        </p:nvSpPr>
-        <p:spPr/>
-        <p:txBody>
-          <a:bodyPr/>
-          <a:lstStyle/>
-          <a:p>
-            <a:fld id="{81F02B84-2724-4998-9FA1-23616E67724A}" type="datetimeFigureOut">
-              <a:rPr lang="ru-RU" smtClean="0"/>
-              <a:t>17.10.2016</a:t>
-            </a:fld>
-            <a:endParaRPr lang="ru-RU"/>
-          </a:p>
-        </p:txBody>
-      </p:sp>
-      <p:sp>
-        <p:nvSpPr>
-          <p:cNvPr id="5" name="Нижний колонтитул 4"/>
-          <p:cNvSpPr>
-            <a:spLocks noGrp="1"/>
-          </p:cNvSpPr>
-          <p:nvPr>
-            <p:ph type="ftr" sz="quarter" idx="11"/>
-          </p:nvPr>
-        </p:nvSpPr>
-        <p:spPr/>
-        <p:txBody>
-          <a:bodyPr/>
-          <a:lstStyle/>
-          <a:p>
-            <a:endParaRPr lang="ru-RU"/>
-          </a:p>
-        </p:txBody>
-      </p:sp>
-      <p:sp>
-        <p:nvSpPr>
-          <p:cNvPr id="6" name="Номер слайда 5"/>
-          <p:cNvSpPr>
-            <a:spLocks noGrp="1"/>
-          </p:cNvSpPr>
-          <p:nvPr>
-            <p:ph type="sldNum" sz="quarter" idx="12"/>
-          </p:nvPr>
-        </p:nvSpPr>
-        <p:spPr/>
-        <p:txBody>
-          <a:bodyPr/>
-          <a:lstStyle/>
           <a:p>
             <a:fld id="{59BD4EE7-3A0D-47BA-A1CD-76BAC7DE5E02}" type="slidenum">
               <a:rPr lang="ru-RU" smtClean="0"/>
@@ -367,6 +406,11 @@
         </p:txBody>
       </p:sp>
     </p:spTree>
+    <p:extLst>
+      <p:ext uri="{BB962C8B-B14F-4D97-AF65-F5344CB8AC3E}">
+        <p14:creationId xmlns:p14="http://schemas.microsoft.com/office/powerpoint/2010/main" val="2086898153"/>
+      </p:ext>
+    </p:extLst>
   </p:cSld>
   <p:clrMapOvr>
     <a:masterClrMapping/>
@@ -393,7 +437,7 @@
       </p:grpSpPr>
       <p:sp>
         <p:nvSpPr>
-          <p:cNvPr id="2" name="Заголовок 1"/>
+          <p:cNvPr id="2" name="Title 1"/>
           <p:cNvSpPr>
             <a:spLocks noGrp="1"/>
           </p:cNvSpPr>
@@ -410,13 +454,13 @@
               <a:rPr lang="ru-RU" smtClean="0"/>
               <a:t>Образец заголовка</a:t>
             </a:r>
-            <a:endParaRPr lang="ru-RU"/>
-          </a:p>
-        </p:txBody>
-      </p:sp>
-      <p:sp>
-        <p:nvSpPr>
-          <p:cNvPr id="3" name="Вертикальный текст 2"/>
+            <a:endParaRPr lang="en-US" dirty="0"/>
+          </a:p>
+        </p:txBody>
+      </p:sp>
+      <p:sp>
+        <p:nvSpPr>
+          <p:cNvPr id="3" name="Vertical Text Placeholder 2"/>
           <p:cNvSpPr>
             <a:spLocks noGrp="1"/>
           </p:cNvSpPr>
@@ -462,13 +506,13 @@
               <a:rPr lang="ru-RU" smtClean="0"/>
               <a:t>Пятый уровень</a:t>
             </a:r>
-            <a:endParaRPr lang="ru-RU"/>
-          </a:p>
-        </p:txBody>
-      </p:sp>
-      <p:sp>
-        <p:nvSpPr>
-          <p:cNvPr id="4" name="Дата 3"/>
+            <a:endParaRPr lang="en-US" dirty="0"/>
+          </a:p>
+        </p:txBody>
+      </p:sp>
+      <p:sp>
+        <p:nvSpPr>
+          <p:cNvPr id="4" name="Date Placeholder 3"/>
           <p:cNvSpPr>
             <a:spLocks noGrp="1"/>
           </p:cNvSpPr>
@@ -483,7 +527,7 @@
           <a:p>
             <a:fld id="{81F02B84-2724-4998-9FA1-23616E67724A}" type="datetimeFigureOut">
               <a:rPr lang="ru-RU" smtClean="0"/>
-              <a:t>17.10.2016</a:t>
+              <a:t>19.10.2016</a:t>
             </a:fld>
             <a:endParaRPr lang="ru-RU"/>
           </a:p>
@@ -491,7 +535,7 @@
       </p:sp>
       <p:sp>
         <p:nvSpPr>
-          <p:cNvPr id="5" name="Нижний колонтитул 4"/>
+          <p:cNvPr id="5" name="Footer Placeholder 4"/>
           <p:cNvSpPr>
             <a:spLocks noGrp="1"/>
           </p:cNvSpPr>
@@ -510,7 +554,7 @@
       </p:sp>
       <p:sp>
         <p:nvSpPr>
-          <p:cNvPr id="6" name="Номер слайда 5"/>
+          <p:cNvPr id="6" name="Slide Number Placeholder 5"/>
           <p:cNvSpPr>
             <a:spLocks noGrp="1"/>
           </p:cNvSpPr>
@@ -532,6 +576,11 @@
         </p:txBody>
       </p:sp>
     </p:spTree>
+    <p:extLst>
+      <p:ext uri="{BB962C8B-B14F-4D97-AF65-F5344CB8AC3E}">
+        <p14:creationId xmlns:p14="http://schemas.microsoft.com/office/powerpoint/2010/main" val="1553890086"/>
+      </p:ext>
+    </p:extLst>
   </p:cSld>
   <p:clrMapOvr>
     <a:masterClrMapping/>
@@ -558,7 +607,7 @@
       </p:grpSpPr>
       <p:sp>
         <p:nvSpPr>
-          <p:cNvPr id="2" name="Вертикальный заголовок 1"/>
+          <p:cNvPr id="2" name="Vertical Title 1"/>
           <p:cNvSpPr>
             <a:spLocks noGrp="1"/>
           </p:cNvSpPr>
@@ -568,8 +617,8 @@
         </p:nvSpPr>
         <p:spPr>
           <a:xfrm>
-            <a:off x="6629400" y="274638"/>
-            <a:ext cx="2057400" cy="5851525"/>
+            <a:off x="6557963" y="695325"/>
+            <a:ext cx="1971675" cy="4800600"/>
           </a:xfrm>
         </p:spPr>
         <p:txBody>
@@ -580,13 +629,13 @@
               <a:rPr lang="ru-RU" smtClean="0"/>
               <a:t>Образец заголовка</a:t>
             </a:r>
-            <a:endParaRPr lang="ru-RU"/>
-          </a:p>
-        </p:txBody>
-      </p:sp>
-      <p:sp>
-        <p:nvSpPr>
-          <p:cNvPr id="3" name="Вертикальный текст 2"/>
+            <a:endParaRPr lang="en-US" dirty="0"/>
+          </a:p>
+        </p:txBody>
+      </p:sp>
+      <p:sp>
+        <p:nvSpPr>
+          <p:cNvPr id="3" name="Vertical Text Placeholder 2"/>
           <p:cNvSpPr>
             <a:spLocks noGrp="1"/>
           </p:cNvSpPr>
@@ -596,8 +645,8 @@
         </p:nvSpPr>
         <p:spPr>
           <a:xfrm>
-            <a:off x="457200" y="274638"/>
-            <a:ext cx="6019800" cy="5851525"/>
+            <a:off x="578644" y="714376"/>
+            <a:ext cx="5800725" cy="5400675"/>
           </a:xfrm>
         </p:spPr>
         <p:txBody>
@@ -637,13 +686,13 @@
               <a:rPr lang="ru-RU" smtClean="0"/>
               <a:t>Пятый уровень</a:t>
             </a:r>
-            <a:endParaRPr lang="ru-RU"/>
-          </a:p>
-        </p:txBody>
-      </p:sp>
-      <p:sp>
-        <p:nvSpPr>
-          <p:cNvPr id="4" name="Дата 3"/>
+            <a:endParaRPr lang="en-US" dirty="0"/>
+          </a:p>
+        </p:txBody>
+      </p:sp>
+      <p:sp>
+        <p:nvSpPr>
+          <p:cNvPr id="4" name="Date Placeholder 3"/>
           <p:cNvSpPr>
             <a:spLocks noGrp="1"/>
           </p:cNvSpPr>
@@ -658,7 +707,7 @@
           <a:p>
             <a:fld id="{81F02B84-2724-4998-9FA1-23616E67724A}" type="datetimeFigureOut">
               <a:rPr lang="ru-RU" smtClean="0"/>
-              <a:t>17.10.2016</a:t>
+              <a:t>19.10.2016</a:t>
             </a:fld>
             <a:endParaRPr lang="ru-RU"/>
           </a:p>
@@ -666,7 +715,7 @@
       </p:sp>
       <p:sp>
         <p:nvSpPr>
-          <p:cNvPr id="5" name="Нижний колонтитул 4"/>
+          <p:cNvPr id="5" name="Footer Placeholder 4"/>
           <p:cNvSpPr>
             <a:spLocks noGrp="1"/>
           </p:cNvSpPr>
@@ -685,7 +734,7 @@
       </p:sp>
       <p:sp>
         <p:nvSpPr>
-          <p:cNvPr id="6" name="Номер слайда 5"/>
+          <p:cNvPr id="6" name="Slide Number Placeholder 5"/>
           <p:cNvSpPr>
             <a:spLocks noGrp="1"/>
           </p:cNvSpPr>
@@ -707,6 +756,11 @@
         </p:txBody>
       </p:sp>
     </p:spTree>
+    <p:extLst>
+      <p:ext uri="{BB962C8B-B14F-4D97-AF65-F5344CB8AC3E}">
+        <p14:creationId xmlns:p14="http://schemas.microsoft.com/office/powerpoint/2010/main" val="2036896567"/>
+      </p:ext>
+    </p:extLst>
   </p:cSld>
   <p:clrMapOvr>
     <a:masterClrMapping/>
@@ -733,7 +787,7 @@
       </p:grpSpPr>
       <p:sp>
         <p:nvSpPr>
-          <p:cNvPr id="2" name="Заголовок 1"/>
+          <p:cNvPr id="2" name="Title 1"/>
           <p:cNvSpPr>
             <a:spLocks noGrp="1"/>
           </p:cNvSpPr>
@@ -750,13 +804,13 @@
               <a:rPr lang="ru-RU" smtClean="0"/>
               <a:t>Образец заголовка</a:t>
             </a:r>
-            <a:endParaRPr lang="ru-RU"/>
-          </a:p>
-        </p:txBody>
-      </p:sp>
-      <p:sp>
-        <p:nvSpPr>
-          <p:cNvPr id="3" name="Содержимое 2"/>
+            <a:endParaRPr lang="en-US" dirty="0"/>
+          </a:p>
+        </p:txBody>
+      </p:sp>
+      <p:sp>
+        <p:nvSpPr>
+          <p:cNvPr id="3" name="Content Placeholder 2"/>
           <p:cNvSpPr>
             <a:spLocks noGrp="1"/>
           </p:cNvSpPr>
@@ -802,13 +856,13 @@
               <a:rPr lang="ru-RU" smtClean="0"/>
               <a:t>Пятый уровень</a:t>
             </a:r>
-            <a:endParaRPr lang="ru-RU"/>
-          </a:p>
-        </p:txBody>
-      </p:sp>
-      <p:sp>
-        <p:nvSpPr>
-          <p:cNvPr id="4" name="Дата 3"/>
+            <a:endParaRPr lang="en-US" dirty="0"/>
+          </a:p>
+        </p:txBody>
+      </p:sp>
+      <p:sp>
+        <p:nvSpPr>
+          <p:cNvPr id="4" name="Date Placeholder 3"/>
           <p:cNvSpPr>
             <a:spLocks noGrp="1"/>
           </p:cNvSpPr>
@@ -823,7 +877,7 @@
           <a:p>
             <a:fld id="{81F02B84-2724-4998-9FA1-23616E67724A}" type="datetimeFigureOut">
               <a:rPr lang="ru-RU" smtClean="0"/>
-              <a:t>17.10.2016</a:t>
+              <a:t>19.10.2016</a:t>
             </a:fld>
             <a:endParaRPr lang="ru-RU"/>
           </a:p>
@@ -831,7 +885,7 @@
       </p:sp>
       <p:sp>
         <p:nvSpPr>
-          <p:cNvPr id="5" name="Нижний колонтитул 4"/>
+          <p:cNvPr id="5" name="Footer Placeholder 4"/>
           <p:cNvSpPr>
             <a:spLocks noGrp="1"/>
           </p:cNvSpPr>
@@ -850,7 +904,7 @@
       </p:sp>
       <p:sp>
         <p:nvSpPr>
-          <p:cNvPr id="6" name="Номер слайда 5"/>
+          <p:cNvPr id="6" name="Slide Number Placeholder 5"/>
           <p:cNvSpPr>
             <a:spLocks noGrp="1"/>
           </p:cNvSpPr>
@@ -872,6 +926,11 @@
         </p:txBody>
       </p:sp>
     </p:spTree>
+    <p:extLst>
+      <p:ext uri="{BB962C8B-B14F-4D97-AF65-F5344CB8AC3E}">
+        <p14:creationId xmlns:p14="http://schemas.microsoft.com/office/powerpoint/2010/main" val="1727463666"/>
+      </p:ext>
+    </p:extLst>
   </p:cSld>
   <p:clrMapOvr>
     <a:masterClrMapping/>
@@ -898,7 +957,7 @@
       </p:grpSpPr>
       <p:sp>
         <p:nvSpPr>
-          <p:cNvPr id="2" name="Заголовок 1"/>
+          <p:cNvPr id="2" name="Title 1"/>
           <p:cNvSpPr>
             <a:spLocks noGrp="1"/>
           </p:cNvSpPr>
@@ -908,15 +967,24 @@
         </p:nvSpPr>
         <p:spPr>
           <a:xfrm>
-            <a:off x="722313" y="4406900"/>
-            <a:ext cx="7772400" cy="1362075"/>
+            <a:off x="452628" y="767419"/>
+            <a:ext cx="8085582" cy="3355848"/>
           </a:xfrm>
         </p:spPr>
         <p:txBody>
-          <a:bodyPr anchor="t"/>
+          <a:bodyPr anchor="b">
+            <a:normAutofit/>
+          </a:bodyPr>
           <a:lstStyle>
-            <a:lvl1pPr algn="l">
-              <a:defRPr sz="4000" b="1" cap="all"/>
+            <a:lvl1pPr>
+              <a:lnSpc>
+                <a:spcPct val="80000"/>
+              </a:lnSpc>
+              <a:defRPr sz="8000" b="0" baseline="0">
+                <a:solidFill>
+                  <a:schemeClr val="accent1"/>
+                </a:solidFill>
+              </a:defRPr>
             </a:lvl1pPr>
           </a:lstStyle>
           <a:p>
@@ -924,13 +992,13 @@
               <a:rPr lang="ru-RU" smtClean="0"/>
               <a:t>Образец заголовка</a:t>
             </a:r>
-            <a:endParaRPr lang="ru-RU"/>
-          </a:p>
-        </p:txBody>
-      </p:sp>
-      <p:sp>
-        <p:nvSpPr>
-          <p:cNvPr id="3" name="Текст 2"/>
+            <a:endParaRPr lang="en-US" dirty="0"/>
+          </a:p>
+        </p:txBody>
+      </p:sp>
+      <p:sp>
+        <p:nvSpPr>
+          <p:cNvPr id="3" name="Text Placeholder 2"/>
           <p:cNvSpPr>
             <a:spLocks noGrp="1"/>
           </p:cNvSpPr>
@@ -940,21 +1008,22 @@
         </p:nvSpPr>
         <p:spPr>
           <a:xfrm>
-            <a:off x="722313" y="2906713"/>
-            <a:ext cx="7772400" cy="1500187"/>
+            <a:off x="500634" y="4187275"/>
+            <a:ext cx="6919722" cy="1645920"/>
           </a:xfrm>
         </p:spPr>
         <p:txBody>
-          <a:bodyPr anchor="b"/>
+          <a:bodyPr anchor="t">
+            <a:normAutofit/>
+          </a:bodyPr>
           <a:lstStyle>
             <a:lvl1pPr marL="0" indent="0">
               <a:buNone/>
-              <a:defRPr sz="2000">
+              <a:defRPr sz="2800">
                 <a:solidFill>
-                  <a:schemeClr val="tx1">
-                    <a:tint val="75000"/>
-                  </a:schemeClr>
+                  <a:schemeClr val="tx1"/>
                 </a:solidFill>
+                <a:latin typeface="+mj-lt"/>
               </a:defRPr>
             </a:lvl1pPr>
             <a:lvl2pPr marL="457200" indent="0">
@@ -1049,7 +1118,7 @@
       </p:sp>
       <p:sp>
         <p:nvSpPr>
-          <p:cNvPr id="4" name="Дата 3"/>
+          <p:cNvPr id="4" name="Date Placeholder 3"/>
           <p:cNvSpPr>
             <a:spLocks noGrp="1"/>
           </p:cNvSpPr>
@@ -1064,7 +1133,7 @@
           <a:p>
             <a:fld id="{81F02B84-2724-4998-9FA1-23616E67724A}" type="datetimeFigureOut">
               <a:rPr lang="ru-RU" smtClean="0"/>
-              <a:t>17.10.2016</a:t>
+              <a:t>19.10.2016</a:t>
             </a:fld>
             <a:endParaRPr lang="ru-RU"/>
           </a:p>
@@ -1072,7 +1141,7 @@
       </p:sp>
       <p:sp>
         <p:nvSpPr>
-          <p:cNvPr id="5" name="Нижний колонтитул 4"/>
+          <p:cNvPr id="5" name="Footer Placeholder 4"/>
           <p:cNvSpPr>
             <a:spLocks noGrp="1"/>
           </p:cNvSpPr>
@@ -1091,7 +1160,7 @@
       </p:sp>
       <p:sp>
         <p:nvSpPr>
-          <p:cNvPr id="6" name="Номер слайда 5"/>
+          <p:cNvPr id="6" name="Slide Number Placeholder 5"/>
           <p:cNvSpPr>
             <a:spLocks noGrp="1"/>
           </p:cNvSpPr>
@@ -1113,6 +1182,11 @@
         </p:txBody>
       </p:sp>
     </p:spTree>
+    <p:extLst>
+      <p:ext uri="{BB962C8B-B14F-4D97-AF65-F5344CB8AC3E}">
+        <p14:creationId xmlns:p14="http://schemas.microsoft.com/office/powerpoint/2010/main" val="669369725"/>
+      </p:ext>
+    </p:extLst>
   </p:cSld>
   <p:clrMapOvr>
     <a:masterClrMapping/>
@@ -1139,7 +1213,7 @@
       </p:grpSpPr>
       <p:sp>
         <p:nvSpPr>
-          <p:cNvPr id="2" name="Заголовок 1"/>
+          <p:cNvPr id="2" name="Title 1"/>
           <p:cNvSpPr>
             <a:spLocks noGrp="1"/>
           </p:cNvSpPr>
@@ -1156,13 +1230,13 @@
               <a:rPr lang="ru-RU" smtClean="0"/>
               <a:t>Образец заголовка</a:t>
             </a:r>
-            <a:endParaRPr lang="ru-RU"/>
-          </a:p>
-        </p:txBody>
-      </p:sp>
-      <p:sp>
-        <p:nvSpPr>
-          <p:cNvPr id="3" name="Содержимое 2"/>
+            <a:endParaRPr lang="en-US" dirty="0"/>
+          </a:p>
+        </p:txBody>
+      </p:sp>
+      <p:sp>
+        <p:nvSpPr>
+          <p:cNvPr id="3" name="Content Placeholder 2"/>
           <p:cNvSpPr>
             <a:spLocks noGrp="1"/>
           </p:cNvSpPr>
@@ -1172,39 +1246,39 @@
         </p:nvSpPr>
         <p:spPr>
           <a:xfrm>
-            <a:off x="457200" y="1600200"/>
-            <a:ext cx="4038600" cy="4525963"/>
+            <a:off x="507492" y="1993392"/>
+            <a:ext cx="3806190" cy="3767328"/>
           </a:xfrm>
         </p:spPr>
         <p:txBody>
           <a:bodyPr/>
           <a:lstStyle>
             <a:lvl1pPr>
-              <a:defRPr sz="2800"/>
+              <a:defRPr sz="2200"/>
             </a:lvl1pPr>
             <a:lvl2pPr>
-              <a:defRPr sz="2400"/>
+              <a:defRPr sz="1900"/>
             </a:lvl2pPr>
             <a:lvl3pPr>
-              <a:defRPr sz="2000"/>
+              <a:defRPr sz="1700"/>
             </a:lvl3pPr>
             <a:lvl4pPr>
-              <a:defRPr sz="1800"/>
+              <a:defRPr sz="1500"/>
             </a:lvl4pPr>
             <a:lvl5pPr>
-              <a:defRPr sz="1800"/>
+              <a:defRPr sz="1400"/>
             </a:lvl5pPr>
             <a:lvl6pPr>
-              <a:defRPr sz="1800"/>
+              <a:defRPr sz="1400"/>
             </a:lvl6pPr>
             <a:lvl7pPr>
-              <a:defRPr sz="1800"/>
+              <a:defRPr sz="1400"/>
             </a:lvl7pPr>
             <a:lvl8pPr>
-              <a:defRPr sz="1800"/>
+              <a:defRPr sz="1400"/>
             </a:lvl8pPr>
             <a:lvl9pPr>
-              <a:defRPr sz="1800"/>
+              <a:defRPr sz="1400"/>
             </a:lvl9pPr>
           </a:lstStyle>
           <a:p>
@@ -1241,13 +1315,13 @@
               <a:rPr lang="ru-RU" smtClean="0"/>
               <a:t>Пятый уровень</a:t>
             </a:r>
-            <a:endParaRPr lang="ru-RU"/>
-          </a:p>
-        </p:txBody>
-      </p:sp>
-      <p:sp>
-        <p:nvSpPr>
-          <p:cNvPr id="4" name="Содержимое 3"/>
+            <a:endParaRPr lang="en-US" dirty="0"/>
+          </a:p>
+        </p:txBody>
+      </p:sp>
+      <p:sp>
+        <p:nvSpPr>
+          <p:cNvPr id="4" name="Content Placeholder 3"/>
           <p:cNvSpPr>
             <a:spLocks noGrp="1"/>
           </p:cNvSpPr>
@@ -1257,39 +1331,39 @@
         </p:nvSpPr>
         <p:spPr>
           <a:xfrm>
-            <a:off x="4648200" y="1600200"/>
-            <a:ext cx="4038600" cy="4525963"/>
+            <a:off x="4757738" y="1993392"/>
+            <a:ext cx="3806190" cy="3767328"/>
           </a:xfrm>
         </p:spPr>
         <p:txBody>
           <a:bodyPr/>
           <a:lstStyle>
             <a:lvl1pPr>
-              <a:defRPr sz="2800"/>
+              <a:defRPr sz="2200"/>
             </a:lvl1pPr>
             <a:lvl2pPr>
-              <a:defRPr sz="2400"/>
+              <a:defRPr sz="1900"/>
             </a:lvl2pPr>
             <a:lvl3pPr>
-              <a:defRPr sz="2000"/>
+              <a:defRPr sz="1700"/>
             </a:lvl3pPr>
             <a:lvl4pPr>
-              <a:defRPr sz="1800"/>
+              <a:defRPr sz="1500"/>
             </a:lvl4pPr>
             <a:lvl5pPr>
-              <a:defRPr sz="1800"/>
+              <a:defRPr sz="1400"/>
             </a:lvl5pPr>
             <a:lvl6pPr>
-              <a:defRPr sz="1800"/>
+              <a:defRPr sz="1400"/>
             </a:lvl6pPr>
             <a:lvl7pPr>
-              <a:defRPr sz="1800"/>
+              <a:defRPr sz="1400"/>
             </a:lvl7pPr>
             <a:lvl8pPr>
-              <a:defRPr sz="1800"/>
+              <a:defRPr sz="1400"/>
             </a:lvl8pPr>
             <a:lvl9pPr>
-              <a:defRPr sz="1800"/>
+              <a:defRPr sz="1400"/>
             </a:lvl9pPr>
           </a:lstStyle>
           <a:p>
@@ -1326,13 +1400,13 @@
               <a:rPr lang="ru-RU" smtClean="0"/>
               <a:t>Пятый уровень</a:t>
             </a:r>
-            <a:endParaRPr lang="ru-RU"/>
-          </a:p>
-        </p:txBody>
-      </p:sp>
-      <p:sp>
-        <p:nvSpPr>
-          <p:cNvPr id="5" name="Дата 4"/>
+            <a:endParaRPr lang="en-US" dirty="0"/>
+          </a:p>
+        </p:txBody>
+      </p:sp>
+      <p:sp>
+        <p:nvSpPr>
+          <p:cNvPr id="5" name="Date Placeholder 4"/>
           <p:cNvSpPr>
             <a:spLocks noGrp="1"/>
           </p:cNvSpPr>
@@ -1347,7 +1421,7 @@
           <a:p>
             <a:fld id="{81F02B84-2724-4998-9FA1-23616E67724A}" type="datetimeFigureOut">
               <a:rPr lang="ru-RU" smtClean="0"/>
-              <a:t>17.10.2016</a:t>
+              <a:t>19.10.2016</a:t>
             </a:fld>
             <a:endParaRPr lang="ru-RU"/>
           </a:p>
@@ -1355,7 +1429,7 @@
       </p:sp>
       <p:sp>
         <p:nvSpPr>
-          <p:cNvPr id="6" name="Нижний колонтитул 5"/>
+          <p:cNvPr id="6" name="Footer Placeholder 5"/>
           <p:cNvSpPr>
             <a:spLocks noGrp="1"/>
           </p:cNvSpPr>
@@ -1374,7 +1448,7 @@
       </p:sp>
       <p:sp>
         <p:nvSpPr>
-          <p:cNvPr id="7" name="Номер слайда 6"/>
+          <p:cNvPr id="7" name="Slide Number Placeholder 6"/>
           <p:cNvSpPr>
             <a:spLocks noGrp="1"/>
           </p:cNvSpPr>
@@ -1396,6 +1470,11 @@
         </p:txBody>
       </p:sp>
     </p:spTree>
+    <p:extLst>
+      <p:ext uri="{BB962C8B-B14F-4D97-AF65-F5344CB8AC3E}">
+        <p14:creationId xmlns:p14="http://schemas.microsoft.com/office/powerpoint/2010/main" val="3345305094"/>
+      </p:ext>
+    </p:extLst>
   </p:cSld>
   <p:clrMapOvr>
     <a:masterClrMapping/>
@@ -1422,7 +1501,7 @@
       </p:grpSpPr>
       <p:sp>
         <p:nvSpPr>
-          <p:cNvPr id="2" name="Заголовок 1"/>
+          <p:cNvPr id="10" name="Title 9"/>
           <p:cNvSpPr>
             <a:spLocks noGrp="1"/>
           </p:cNvSpPr>
@@ -1433,23 +1512,19 @@
         <p:spPr/>
         <p:txBody>
           <a:bodyPr/>
-          <a:lstStyle>
-            <a:lvl1pPr>
-              <a:defRPr/>
-            </a:lvl1pPr>
-          </a:lstStyle>
+          <a:lstStyle/>
           <a:p>
             <a:r>
               <a:rPr lang="ru-RU" smtClean="0"/>
               <a:t>Образец заголовка</a:t>
             </a:r>
-            <a:endParaRPr lang="ru-RU"/>
-          </a:p>
-        </p:txBody>
-      </p:sp>
-      <p:sp>
-        <p:nvSpPr>
-          <p:cNvPr id="3" name="Текст 2"/>
+            <a:endParaRPr lang="en-US" dirty="0"/>
+          </a:p>
+        </p:txBody>
+      </p:sp>
+      <p:sp>
+        <p:nvSpPr>
+          <p:cNvPr id="3" name="Text Placeholder 2"/>
           <p:cNvSpPr>
             <a:spLocks noGrp="1"/>
           </p:cNvSpPr>
@@ -1459,16 +1534,29 @@
         </p:nvSpPr>
         <p:spPr>
           <a:xfrm>
-            <a:off x="457200" y="1535113"/>
-            <a:ext cx="4040188" cy="639762"/>
+            <a:off x="507492" y="2032000"/>
+            <a:ext cx="3806190" cy="723400"/>
           </a:xfrm>
         </p:spPr>
         <p:txBody>
-          <a:bodyPr anchor="b"/>
+          <a:bodyPr anchor="ctr">
+            <a:normAutofit/>
+          </a:bodyPr>
           <a:lstStyle>
             <a:lvl1pPr marL="0" indent="0">
-              <a:buNone/>
-              <a:defRPr sz="2400" b="1"/>
+              <a:spcBef>
+                <a:spcPts val="0"/>
+              </a:spcBef>
+              <a:buNone/>
+              <a:defRPr sz="2000" b="0" cap="all" baseline="0">
+                <a:solidFill>
+                  <a:schemeClr val="tx1">
+                    <a:lumMod val="85000"/>
+                    <a:lumOff val="15000"/>
+                  </a:schemeClr>
+                </a:solidFill>
+                <a:latin typeface="+mj-lt"/>
+              </a:defRPr>
             </a:lvl1pPr>
             <a:lvl2pPr marL="457200" indent="0">
               <a:buNone/>
@@ -1514,7 +1602,7 @@
       </p:sp>
       <p:sp>
         <p:nvSpPr>
-          <p:cNvPr id="4" name="Содержимое 3"/>
+          <p:cNvPr id="4" name="Content Placeholder 3"/>
           <p:cNvSpPr>
             <a:spLocks noGrp="1"/>
           </p:cNvSpPr>
@@ -1524,39 +1612,39 @@
         </p:nvSpPr>
         <p:spPr>
           <a:xfrm>
-            <a:off x="457200" y="2174875"/>
-            <a:ext cx="4040188" cy="3951288"/>
+            <a:off x="507492" y="2736150"/>
+            <a:ext cx="3806190" cy="3200400"/>
           </a:xfrm>
         </p:spPr>
         <p:txBody>
           <a:bodyPr/>
           <a:lstStyle>
             <a:lvl1pPr>
-              <a:defRPr sz="2400"/>
+              <a:defRPr sz="2100"/>
             </a:lvl1pPr>
             <a:lvl2pPr>
-              <a:defRPr sz="2000"/>
+              <a:defRPr sz="1800"/>
             </a:lvl2pPr>
             <a:lvl3pPr>
-              <a:defRPr sz="1800"/>
+              <a:defRPr sz="1600"/>
             </a:lvl3pPr>
             <a:lvl4pPr>
-              <a:defRPr sz="1600"/>
+              <a:defRPr sz="1400"/>
             </a:lvl4pPr>
             <a:lvl5pPr>
-              <a:defRPr sz="1600"/>
+              <a:defRPr sz="1400"/>
             </a:lvl5pPr>
             <a:lvl6pPr>
-              <a:defRPr sz="1600"/>
+              <a:defRPr sz="1400"/>
             </a:lvl6pPr>
             <a:lvl7pPr>
-              <a:defRPr sz="1600"/>
+              <a:defRPr sz="1400"/>
             </a:lvl7pPr>
             <a:lvl8pPr>
-              <a:defRPr sz="1600"/>
+              <a:defRPr sz="1400"/>
             </a:lvl8pPr>
             <a:lvl9pPr>
-              <a:defRPr sz="1600"/>
+              <a:defRPr sz="1400"/>
             </a:lvl9pPr>
           </a:lstStyle>
           <a:p>
@@ -1593,13 +1681,13 @@
               <a:rPr lang="ru-RU" smtClean="0"/>
               <a:t>Пятый уровень</a:t>
             </a:r>
-            <a:endParaRPr lang="ru-RU"/>
-          </a:p>
-        </p:txBody>
-      </p:sp>
-      <p:sp>
-        <p:nvSpPr>
-          <p:cNvPr id="5" name="Текст 4"/>
+            <a:endParaRPr lang="en-US" dirty="0"/>
+          </a:p>
+        </p:txBody>
+      </p:sp>
+      <p:sp>
+        <p:nvSpPr>
+          <p:cNvPr id="5" name="Text Placeholder 4"/>
           <p:cNvSpPr>
             <a:spLocks noGrp="1"/>
           </p:cNvSpPr>
@@ -1609,16 +1697,23 @@
         </p:nvSpPr>
         <p:spPr>
           <a:xfrm>
-            <a:off x="4645025" y="1535113"/>
-            <a:ext cx="4041775" cy="639762"/>
+            <a:off x="4766310" y="2029968"/>
+            <a:ext cx="3806190" cy="722376"/>
           </a:xfrm>
         </p:spPr>
         <p:txBody>
-          <a:bodyPr anchor="b"/>
+          <a:bodyPr anchor="ctr">
+            <a:normAutofit/>
+          </a:bodyPr>
           <a:lstStyle>
             <a:lvl1pPr marL="0" indent="0">
-              <a:buNone/>
-              <a:defRPr sz="2400" b="1"/>
+              <a:spcBef>
+                <a:spcPts val="0"/>
+              </a:spcBef>
+              <a:buNone/>
+              <a:defRPr sz="2000" b="0" cap="all" baseline="0">
+                <a:latin typeface="+mj-lt"/>
+              </a:defRPr>
             </a:lvl1pPr>
             <a:lvl2pPr marL="457200" indent="0">
               <a:buNone/>
@@ -1664,7 +1759,7 @@
       </p:sp>
       <p:sp>
         <p:nvSpPr>
-          <p:cNvPr id="6" name="Содержимое 5"/>
+          <p:cNvPr id="6" name="Content Placeholder 5"/>
           <p:cNvSpPr>
             <a:spLocks noGrp="1"/>
           </p:cNvSpPr>
@@ -1674,39 +1769,39 @@
         </p:nvSpPr>
         <p:spPr>
           <a:xfrm>
-            <a:off x="4645025" y="2174875"/>
-            <a:ext cx="4041775" cy="3951288"/>
+            <a:off x="4766310" y="2734056"/>
+            <a:ext cx="3806190" cy="3200400"/>
           </a:xfrm>
         </p:spPr>
         <p:txBody>
           <a:bodyPr/>
           <a:lstStyle>
             <a:lvl1pPr>
-              <a:defRPr sz="2400"/>
+              <a:defRPr sz="2100"/>
             </a:lvl1pPr>
             <a:lvl2pPr>
-              <a:defRPr sz="2000"/>
+              <a:defRPr sz="1800"/>
             </a:lvl2pPr>
             <a:lvl3pPr>
-              <a:defRPr sz="1800"/>
+              <a:defRPr sz="1600"/>
             </a:lvl3pPr>
             <a:lvl4pPr>
-              <a:defRPr sz="1600"/>
+              <a:defRPr sz="1400"/>
             </a:lvl4pPr>
             <a:lvl5pPr>
-              <a:defRPr sz="1600"/>
+              <a:defRPr sz="1400"/>
             </a:lvl5pPr>
             <a:lvl6pPr>
-              <a:defRPr sz="1600"/>
+              <a:defRPr sz="1400"/>
             </a:lvl6pPr>
             <a:lvl7pPr>
-              <a:defRPr sz="1600"/>
+              <a:defRPr sz="1400"/>
             </a:lvl7pPr>
             <a:lvl8pPr>
-              <a:defRPr sz="1600"/>
+              <a:defRPr sz="1400"/>
             </a:lvl8pPr>
             <a:lvl9pPr>
-              <a:defRPr sz="1600"/>
+              <a:defRPr sz="1400"/>
             </a:lvl9pPr>
           </a:lstStyle>
           <a:p>
@@ -1743,13 +1838,13 @@
               <a:rPr lang="ru-RU" smtClean="0"/>
               <a:t>Пятый уровень</a:t>
             </a:r>
-            <a:endParaRPr lang="ru-RU"/>
-          </a:p>
-        </p:txBody>
-      </p:sp>
-      <p:sp>
-        <p:nvSpPr>
-          <p:cNvPr id="7" name="Дата 6"/>
+            <a:endParaRPr lang="en-US" dirty="0"/>
+          </a:p>
+        </p:txBody>
+      </p:sp>
+      <p:sp>
+        <p:nvSpPr>
+          <p:cNvPr id="7" name="Date Placeholder 6"/>
           <p:cNvSpPr>
             <a:spLocks noGrp="1"/>
           </p:cNvSpPr>
@@ -1764,7 +1859,7 @@
           <a:p>
             <a:fld id="{81F02B84-2724-4998-9FA1-23616E67724A}" type="datetimeFigureOut">
               <a:rPr lang="ru-RU" smtClean="0"/>
-              <a:t>17.10.2016</a:t>
+              <a:t>19.10.2016</a:t>
             </a:fld>
             <a:endParaRPr lang="ru-RU"/>
           </a:p>
@@ -1772,7 +1867,7 @@
       </p:sp>
       <p:sp>
         <p:nvSpPr>
-          <p:cNvPr id="8" name="Нижний колонтитул 7"/>
+          <p:cNvPr id="8" name="Footer Placeholder 7"/>
           <p:cNvSpPr>
             <a:spLocks noGrp="1"/>
           </p:cNvSpPr>
@@ -1791,7 +1886,7 @@
       </p:sp>
       <p:sp>
         <p:nvSpPr>
-          <p:cNvPr id="9" name="Номер слайда 8"/>
+          <p:cNvPr id="9" name="Slide Number Placeholder 8"/>
           <p:cNvSpPr>
             <a:spLocks noGrp="1"/>
           </p:cNvSpPr>
@@ -1813,6 +1908,11 @@
         </p:txBody>
       </p:sp>
     </p:spTree>
+    <p:extLst>
+      <p:ext uri="{BB962C8B-B14F-4D97-AF65-F5344CB8AC3E}">
+        <p14:creationId xmlns:p14="http://schemas.microsoft.com/office/powerpoint/2010/main" val="1841112992"/>
+      </p:ext>
+    </p:extLst>
   </p:cSld>
   <p:clrMapOvr>
     <a:masterClrMapping/>
@@ -1839,7 +1939,7 @@
       </p:grpSpPr>
       <p:sp>
         <p:nvSpPr>
-          <p:cNvPr id="2" name="Заголовок 1"/>
+          <p:cNvPr id="6" name="Title 5"/>
           <p:cNvSpPr>
             <a:spLocks noGrp="1"/>
           </p:cNvSpPr>
@@ -1856,13 +1956,13 @@
               <a:rPr lang="ru-RU" smtClean="0"/>
               <a:t>Образец заголовка</a:t>
             </a:r>
-            <a:endParaRPr lang="ru-RU"/>
-          </a:p>
-        </p:txBody>
-      </p:sp>
-      <p:sp>
-        <p:nvSpPr>
-          <p:cNvPr id="3" name="Дата 2"/>
+            <a:endParaRPr lang="en-US" dirty="0"/>
+          </a:p>
+        </p:txBody>
+      </p:sp>
+      <p:sp>
+        <p:nvSpPr>
+          <p:cNvPr id="3" name="Date Placeholder 2"/>
           <p:cNvSpPr>
             <a:spLocks noGrp="1"/>
           </p:cNvSpPr>
@@ -1877,7 +1977,7 @@
           <a:p>
             <a:fld id="{81F02B84-2724-4998-9FA1-23616E67724A}" type="datetimeFigureOut">
               <a:rPr lang="ru-RU" smtClean="0"/>
-              <a:t>17.10.2016</a:t>
+              <a:t>19.10.2016</a:t>
             </a:fld>
             <a:endParaRPr lang="ru-RU"/>
           </a:p>
@@ -1885,7 +1985,7 @@
       </p:sp>
       <p:sp>
         <p:nvSpPr>
-          <p:cNvPr id="4" name="Нижний колонтитул 3"/>
+          <p:cNvPr id="4" name="Footer Placeholder 3"/>
           <p:cNvSpPr>
             <a:spLocks noGrp="1"/>
           </p:cNvSpPr>
@@ -1904,7 +2004,7 @@
       </p:sp>
       <p:sp>
         <p:nvSpPr>
-          <p:cNvPr id="5" name="Номер слайда 4"/>
+          <p:cNvPr id="5" name="Slide Number Placeholder 4"/>
           <p:cNvSpPr>
             <a:spLocks noGrp="1"/>
           </p:cNvSpPr>
@@ -1926,6 +2026,11 @@
         </p:txBody>
       </p:sp>
     </p:spTree>
+    <p:extLst>
+      <p:ext uri="{BB962C8B-B14F-4D97-AF65-F5344CB8AC3E}">
+        <p14:creationId xmlns:p14="http://schemas.microsoft.com/office/powerpoint/2010/main" val="4241609720"/>
+      </p:ext>
+    </p:extLst>
   </p:cSld>
   <p:clrMapOvr>
     <a:masterClrMapping/>
@@ -1952,7 +2057,7 @@
       </p:grpSpPr>
       <p:sp>
         <p:nvSpPr>
-          <p:cNvPr id="2" name="Дата 1"/>
+          <p:cNvPr id="2" name="Date Placeholder 1"/>
           <p:cNvSpPr>
             <a:spLocks noGrp="1"/>
           </p:cNvSpPr>
@@ -1967,7 +2072,7 @@
           <a:p>
             <a:fld id="{81F02B84-2724-4998-9FA1-23616E67724A}" type="datetimeFigureOut">
               <a:rPr lang="ru-RU" smtClean="0"/>
-              <a:t>17.10.2016</a:t>
+              <a:t>19.10.2016</a:t>
             </a:fld>
             <a:endParaRPr lang="ru-RU"/>
           </a:p>
@@ -1975,7 +2080,7 @@
       </p:sp>
       <p:sp>
         <p:nvSpPr>
-          <p:cNvPr id="3" name="Нижний колонтитул 2"/>
+          <p:cNvPr id="3" name="Footer Placeholder 2"/>
           <p:cNvSpPr>
             <a:spLocks noGrp="1"/>
           </p:cNvSpPr>
@@ -1994,7 +2099,7 @@
       </p:sp>
       <p:sp>
         <p:nvSpPr>
-          <p:cNvPr id="4" name="Номер слайда 3"/>
+          <p:cNvPr id="4" name="Slide Number Placeholder 3"/>
           <p:cNvSpPr>
             <a:spLocks noGrp="1"/>
           </p:cNvSpPr>
@@ -2016,6 +2121,11 @@
         </p:txBody>
       </p:sp>
     </p:spTree>
+    <p:extLst>
+      <p:ext uri="{BB962C8B-B14F-4D97-AF65-F5344CB8AC3E}">
+        <p14:creationId xmlns:p14="http://schemas.microsoft.com/office/powerpoint/2010/main" val="2235729839"/>
+      </p:ext>
+    </p:extLst>
   </p:cSld>
   <p:clrMapOvr>
     <a:masterClrMapping/>
@@ -2042,25 +2152,69 @@
       </p:grpSpPr>
       <p:sp>
         <p:nvSpPr>
-          <p:cNvPr id="2" name="Заголовок 1"/>
-          <p:cNvSpPr>
-            <a:spLocks noGrp="1"/>
-          </p:cNvSpPr>
-          <p:nvPr>
-            <p:ph type="title"/>
-          </p:nvPr>
+          <p:cNvPr id="2" name="Rectangle 1"/>
+          <p:cNvSpPr/>
+          <p:nvPr/>
         </p:nvSpPr>
         <p:spPr>
           <a:xfrm>
-            <a:off x="457200" y="273050"/>
-            <a:ext cx="3008313" cy="1162050"/>
+            <a:off x="5715000" y="0"/>
+            <a:ext cx="3429000" cy="6858000"/>
+          </a:xfrm>
+          <a:prstGeom prst="rect">
+            <a:avLst/>
+          </a:prstGeom>
+          <a:ln>
+            <a:noFill/>
+          </a:ln>
+        </p:spPr>
+        <p:style>
+          <a:lnRef idx="2">
+            <a:schemeClr val="accent1">
+              <a:shade val="50000"/>
+            </a:schemeClr>
+          </a:lnRef>
+          <a:fillRef idx="1">
+            <a:schemeClr val="accent1"/>
+          </a:fillRef>
+          <a:effectRef idx="0">
+            <a:schemeClr val="accent1"/>
+          </a:effectRef>
+          <a:fontRef idx="minor">
+            <a:schemeClr val="lt1"/>
+          </a:fontRef>
+        </p:style>
+      </p:sp>
+      <p:sp>
+        <p:nvSpPr>
+          <p:cNvPr id="9" name="Title 8"/>
+          <p:cNvSpPr>
+            <a:spLocks noGrp="1"/>
+          </p:cNvSpPr>
+          <p:nvPr>
+            <p:ph type="title"/>
+          </p:nvPr>
+        </p:nvSpPr>
+        <p:spPr>
+          <a:xfrm>
+            <a:off x="6196053" y="542282"/>
+            <a:ext cx="2537460" cy="1920240"/>
           </a:xfrm>
         </p:spPr>
         <p:txBody>
-          <a:bodyPr anchor="b"/>
+          <a:bodyPr anchor="b">
+            <a:noAutofit/>
+          </a:bodyPr>
           <a:lstStyle>
-            <a:lvl1pPr algn="l">
-              <a:defRPr sz="2000" b="1"/>
+            <a:lvl1pPr>
+              <a:lnSpc>
+                <a:spcPct val="85000"/>
+              </a:lnSpc>
+              <a:defRPr sz="3600">
+                <a:solidFill>
+                  <a:srgbClr val="FFFFFF"/>
+                </a:solidFill>
+              </a:defRPr>
             </a:lvl1pPr>
           </a:lstStyle>
           <a:p>
@@ -2068,13 +2222,13 @@
               <a:rPr lang="ru-RU" smtClean="0"/>
               <a:t>Образец заголовка</a:t>
             </a:r>
-            <a:endParaRPr lang="ru-RU"/>
-          </a:p>
-        </p:txBody>
-      </p:sp>
-      <p:sp>
-        <p:nvSpPr>
-          <p:cNvPr id="3" name="Содержимое 2"/>
+            <a:endParaRPr lang="en-US" dirty="0"/>
+          </a:p>
+        </p:txBody>
+      </p:sp>
+      <p:sp>
+        <p:nvSpPr>
+          <p:cNvPr id="3" name="Content Placeholder 2"/>
           <p:cNvSpPr>
             <a:spLocks noGrp="1"/>
           </p:cNvSpPr>
@@ -2084,39 +2238,39 @@
         </p:nvSpPr>
         <p:spPr>
           <a:xfrm>
-            <a:off x="3575050" y="273050"/>
-            <a:ext cx="5111750" cy="5853113"/>
+            <a:off x="571500" y="762000"/>
+            <a:ext cx="4572000" cy="4572000"/>
           </a:xfrm>
         </p:spPr>
         <p:txBody>
           <a:bodyPr/>
           <a:lstStyle>
             <a:lvl1pPr>
-              <a:defRPr sz="3200"/>
+              <a:defRPr sz="2200"/>
             </a:lvl1pPr>
             <a:lvl2pPr>
-              <a:defRPr sz="2800"/>
+              <a:defRPr sz="1900"/>
             </a:lvl2pPr>
             <a:lvl3pPr>
-              <a:defRPr sz="2400"/>
+              <a:defRPr sz="1700"/>
             </a:lvl3pPr>
             <a:lvl4pPr>
-              <a:defRPr sz="2000"/>
+              <a:defRPr sz="1500"/>
             </a:lvl4pPr>
             <a:lvl5pPr>
-              <a:defRPr sz="2000"/>
+              <a:defRPr sz="1400"/>
             </a:lvl5pPr>
             <a:lvl6pPr>
-              <a:defRPr sz="2000"/>
+              <a:defRPr sz="1400"/>
             </a:lvl6pPr>
             <a:lvl7pPr>
-              <a:defRPr sz="2000"/>
+              <a:defRPr sz="1400"/>
             </a:lvl7pPr>
             <a:lvl8pPr>
-              <a:defRPr sz="2000"/>
+              <a:defRPr sz="1400"/>
             </a:lvl8pPr>
             <a:lvl9pPr>
-              <a:defRPr sz="2000"/>
+              <a:defRPr sz="1400"/>
             </a:lvl9pPr>
           </a:lstStyle>
           <a:p>
@@ -2153,13 +2307,13 @@
               <a:rPr lang="ru-RU" smtClean="0"/>
               <a:t>Пятый уровень</a:t>
             </a:r>
-            <a:endParaRPr lang="ru-RU"/>
-          </a:p>
-        </p:txBody>
-      </p:sp>
-      <p:sp>
-        <p:nvSpPr>
-          <p:cNvPr id="4" name="Текст 3"/>
+            <a:endParaRPr lang="en-US" dirty="0"/>
+          </a:p>
+        </p:txBody>
+      </p:sp>
+      <p:sp>
+        <p:nvSpPr>
+          <p:cNvPr id="4" name="Text Placeholder 3"/>
           <p:cNvSpPr>
             <a:spLocks noGrp="1"/>
           </p:cNvSpPr>
@@ -2169,16 +2323,35 @@
         </p:nvSpPr>
         <p:spPr>
           <a:xfrm>
-            <a:off x="457200" y="1435100"/>
-            <a:ext cx="3008313" cy="4691063"/>
+            <a:off x="6206987" y="2511813"/>
+            <a:ext cx="2548890" cy="3126987"/>
           </a:xfrm>
         </p:spPr>
         <p:txBody>
-          <a:bodyPr/>
+          <a:bodyPr>
+            <a:normAutofit/>
+          </a:bodyPr>
           <a:lstStyle>
-            <a:lvl1pPr marL="0" indent="0">
-              <a:buNone/>
-              <a:defRPr sz="1400"/>
+            <a:lvl1pPr marL="0" marR="0" indent="0" algn="l" defTabSz="914400" rtl="0" eaLnBrk="1" fontAlgn="auto" latinLnBrk="0" hangingPunct="1">
+              <a:lnSpc>
+                <a:spcPct val="100000"/>
+              </a:lnSpc>
+              <a:spcBef>
+                <a:spcPts val="1200"/>
+              </a:spcBef>
+              <a:spcAft>
+                <a:spcPts val="0"/>
+              </a:spcAft>
+              <a:buClrTx/>
+              <a:buSzTx/>
+              <a:buFontTx/>
+              <a:buNone/>
+              <a:tabLst/>
+              <a:defRPr sz="1500">
+                <a:solidFill>
+                  <a:srgbClr val="404040"/>
+                </a:solidFill>
+              </a:defRPr>
             </a:lvl1pPr>
             <a:lvl2pPr marL="457200" indent="0">
               <a:buNone/>
@@ -2214,7 +2387,23 @@
             </a:lvl9pPr>
           </a:lstStyle>
           <a:p>
-            <a:pPr lvl="0"/>
+            <a:pPr marL="0" marR="0" lvl="0" indent="0" algn="l" defTabSz="914400" rtl="0" eaLnBrk="1" fontAlgn="auto" latinLnBrk="0" hangingPunct="1">
+              <a:lnSpc>
+                <a:spcPct val="100000"/>
+              </a:lnSpc>
+              <a:spcBef>
+                <a:spcPts val="1400"/>
+              </a:spcBef>
+              <a:spcAft>
+                <a:spcPts val="0"/>
+              </a:spcAft>
+              <a:buClrTx/>
+              <a:buSzTx/>
+              <a:buFontTx/>
+              <a:buNone/>
+              <a:tabLst/>
+              <a:defRPr/>
+            </a:pPr>
             <a:r>
               <a:rPr lang="ru-RU" smtClean="0"/>
               <a:t>Образец текста</a:t>
@@ -2224,7 +2413,7 @@
       </p:sp>
       <p:sp>
         <p:nvSpPr>
-          <p:cNvPr id="5" name="Дата 4"/>
+          <p:cNvPr id="5" name="Date Placeholder 4"/>
           <p:cNvSpPr>
             <a:spLocks noGrp="1"/>
           </p:cNvSpPr>
@@ -2239,7 +2428,7 @@
           <a:p>
             <a:fld id="{81F02B84-2724-4998-9FA1-23616E67724A}" type="datetimeFigureOut">
               <a:rPr lang="ru-RU" smtClean="0"/>
-              <a:t>17.10.2016</a:t>
+              <a:t>19.10.2016</a:t>
             </a:fld>
             <a:endParaRPr lang="ru-RU"/>
           </a:p>
@@ -2247,7 +2436,7 @@
       </p:sp>
       <p:sp>
         <p:nvSpPr>
-          <p:cNvPr id="6" name="Нижний колонтитул 5"/>
+          <p:cNvPr id="6" name="Footer Placeholder 5"/>
           <p:cNvSpPr>
             <a:spLocks noGrp="1"/>
           </p:cNvSpPr>
@@ -2266,7 +2455,7 @@
       </p:sp>
       <p:sp>
         <p:nvSpPr>
-          <p:cNvPr id="7" name="Номер слайда 6"/>
+          <p:cNvPr id="7" name="Slide Number Placeholder 6"/>
           <p:cNvSpPr>
             <a:spLocks noGrp="1"/>
           </p:cNvSpPr>
@@ -2277,7 +2466,17 @@
         <p:spPr/>
         <p:txBody>
           <a:bodyPr/>
-          <a:lstStyle/>
+          <a:lstStyle>
+            <a:lvl1pPr>
+              <a:defRPr>
+                <a:solidFill>
+                  <a:srgbClr val="FFFFFF">
+                    <a:alpha val="20000"/>
+                  </a:srgbClr>
+                </a:solidFill>
+              </a:defRPr>
+            </a:lvl1pPr>
+          </a:lstStyle>
           <a:p>
             <a:fld id="{59BD4EE7-3A0D-47BA-A1CD-76BAC7DE5E02}" type="slidenum">
               <a:rPr lang="ru-RU" smtClean="0"/>
@@ -2288,6 +2487,11 @@
         </p:txBody>
       </p:sp>
     </p:spTree>
+    <p:extLst>
+      <p:ext uri="{BB962C8B-B14F-4D97-AF65-F5344CB8AC3E}">
+        <p14:creationId xmlns:p14="http://schemas.microsoft.com/office/powerpoint/2010/main" val="3538119577"/>
+      </p:ext>
+    </p:extLst>
   </p:cSld>
   <p:clrMapOvr>
     <a:masterClrMapping/>
@@ -2298,6 +2502,14 @@
 <file path=ppt/slideLayouts/slideLayout9.xml><?xml version="1.0" encoding="utf-8"?>
 <p:sldLayout xmlns:a="http://schemas.openxmlformats.org/drawingml/2006/main" xmlns:r="http://schemas.openxmlformats.org/officeDocument/2006/relationships" xmlns:p="http://schemas.openxmlformats.org/presentationml/2006/main" type="picTx" preserve="1">
   <p:cSld name="Рисунок с подписью">
+    <p:bg>
+      <p:bgPr>
+        <a:solidFill>
+          <a:schemeClr val="accent1"/>
+        </a:solidFill>
+        <a:effectLst/>
+      </p:bgPr>
+    </p:bg>
     <p:spTree>
       <p:nvGrpSpPr>
         <p:cNvPr id="1" name=""/>
@@ -2314,7 +2526,7 @@
       </p:grpSpPr>
       <p:sp>
         <p:nvSpPr>
-          <p:cNvPr id="2" name="Заголовок 1"/>
+          <p:cNvPr id="2" name="Title 1"/>
           <p:cNvSpPr>
             <a:spLocks noGrp="1"/>
           </p:cNvSpPr>
@@ -2324,15 +2536,24 @@
         </p:nvSpPr>
         <p:spPr>
           <a:xfrm>
-            <a:off x="1792288" y="4800600"/>
-            <a:ext cx="5486400" cy="566738"/>
+            <a:off x="486918" y="5418668"/>
+            <a:ext cx="8085582" cy="613283"/>
           </a:xfrm>
         </p:spPr>
         <p:txBody>
-          <a:bodyPr anchor="b"/>
+          <a:bodyPr anchor="b">
+            <a:normAutofit/>
+          </a:bodyPr>
           <a:lstStyle>
-            <a:lvl1pPr algn="l">
-              <a:defRPr sz="2000" b="1"/>
+            <a:lvl1pPr>
+              <a:lnSpc>
+                <a:spcPct val="85000"/>
+              </a:lnSpc>
+              <a:defRPr sz="2800" b="0">
+                <a:solidFill>
+                  <a:srgbClr val="FFFFFF"/>
+                </a:solidFill>
+              </a:defRPr>
             </a:lvl1pPr>
           </a:lstStyle>
           <a:p>
@@ -2340,15 +2561,15 @@
               <a:rPr lang="ru-RU" smtClean="0"/>
               <a:t>Образец заголовка</a:t>
             </a:r>
-            <a:endParaRPr lang="ru-RU"/>
-          </a:p>
-        </p:txBody>
-      </p:sp>
-      <p:sp>
-        <p:nvSpPr>
-          <p:cNvPr id="3" name="Рисунок 2"/>
-          <p:cNvSpPr>
-            <a:spLocks noGrp="1"/>
+            <a:endParaRPr lang="en-US" dirty="0"/>
+          </a:p>
+        </p:txBody>
+      </p:sp>
+      <p:sp>
+        <p:nvSpPr>
+          <p:cNvPr id="3" name="Picture Placeholder 2"/>
+          <p:cNvSpPr>
+            <a:spLocks noGrp="1" noChangeAspect="1"/>
           </p:cNvSpPr>
           <p:nvPr>
             <p:ph type="pic" idx="1"/>
@@ -2356,16 +2577,29 @@
         </p:nvSpPr>
         <p:spPr>
           <a:xfrm>
-            <a:off x="1792288" y="612775"/>
-            <a:ext cx="5486400" cy="4114800"/>
+            <a:off x="0" y="0"/>
+            <a:ext cx="9144000" cy="5330952"/>
           </a:xfrm>
+          <a:blipFill>
+            <a:blip r:embed="rId2"/>
+            <a:stretch>
+              <a:fillRect/>
+            </a:stretch>
+          </a:blipFill>
         </p:spPr>
         <p:txBody>
-          <a:bodyPr/>
+          <a:bodyPr anchor="t"/>
           <a:lstStyle>
-            <a:lvl1pPr marL="0" indent="0">
-              <a:buNone/>
-              <a:defRPr sz="3200"/>
+            <a:lvl1pPr marL="0" indent="0" algn="ctr">
+              <a:spcBef>
+                <a:spcPts val="800"/>
+              </a:spcBef>
+              <a:buNone/>
+              <a:defRPr sz="3200">
+                <a:solidFill>
+                  <a:srgbClr val="4D4D4D"/>
+                </a:solidFill>
+              </a:defRPr>
             </a:lvl1pPr>
             <a:lvl2pPr marL="457200" indent="0">
               <a:buNone/>
@@ -2401,13 +2635,17 @@
             </a:lvl9pPr>
           </a:lstStyle>
           <a:p>
-            <a:endParaRPr lang="ru-RU"/>
-          </a:p>
-        </p:txBody>
-      </p:sp>
-      <p:sp>
-        <p:nvSpPr>
-          <p:cNvPr id="4" name="Текст 3"/>
+            <a:r>
+              <a:rPr lang="ru-RU" smtClean="0"/>
+              <a:t>Вставка рисунка</a:t>
+            </a:r>
+            <a:endParaRPr lang="en-US" dirty="0"/>
+          </a:p>
+        </p:txBody>
+      </p:sp>
+      <p:sp>
+        <p:nvSpPr>
+          <p:cNvPr id="4" name="Text Placeholder 3"/>
           <p:cNvSpPr>
             <a:spLocks noGrp="1"/>
           </p:cNvSpPr>
@@ -2417,16 +2655,28 @@
         </p:nvSpPr>
         <p:spPr>
           <a:xfrm>
-            <a:off x="1792288" y="5367338"/>
-            <a:ext cx="5486400" cy="804862"/>
+            <a:off x="507492" y="5909735"/>
+            <a:ext cx="6922008" cy="533400"/>
           </a:xfrm>
         </p:spPr>
         <p:txBody>
-          <a:bodyPr/>
+          <a:bodyPr>
+            <a:normAutofit/>
+          </a:bodyPr>
           <a:lstStyle>
             <a:lvl1pPr marL="0" indent="0">
-              <a:buNone/>
-              <a:defRPr sz="1400"/>
+              <a:lnSpc>
+                <a:spcPct val="90000"/>
+              </a:lnSpc>
+              <a:spcBef>
+                <a:spcPts val="1200"/>
+              </a:spcBef>
+              <a:buNone/>
+              <a:defRPr sz="1400">
+                <a:solidFill>
+                  <a:srgbClr val="262626"/>
+                </a:solidFill>
+              </a:defRPr>
             </a:lvl1pPr>
             <a:lvl2pPr marL="457200" indent="0">
               <a:buNone/>
@@ -2472,7 +2722,7 @@
       </p:sp>
       <p:sp>
         <p:nvSpPr>
-          <p:cNvPr id="5" name="Дата 4"/>
+          <p:cNvPr id="5" name="Date Placeholder 4"/>
           <p:cNvSpPr>
             <a:spLocks noGrp="1"/>
           </p:cNvSpPr>
@@ -2483,11 +2733,21 @@
         <p:spPr/>
         <p:txBody>
           <a:bodyPr/>
-          <a:lstStyle/>
+          <a:lstStyle>
+            <a:lvl1pPr>
+              <a:defRPr>
+                <a:solidFill>
+                  <a:srgbClr val="FFFFFF">
+                    <a:alpha val="75000"/>
+                  </a:srgbClr>
+                </a:solidFill>
+              </a:defRPr>
+            </a:lvl1pPr>
+          </a:lstStyle>
           <a:p>
             <a:fld id="{81F02B84-2724-4998-9FA1-23616E67724A}" type="datetimeFigureOut">
               <a:rPr lang="ru-RU" smtClean="0"/>
-              <a:t>17.10.2016</a:t>
+              <a:t>19.10.2016</a:t>
             </a:fld>
             <a:endParaRPr lang="ru-RU"/>
           </a:p>
@@ -2495,7 +2755,7 @@
       </p:sp>
       <p:sp>
         <p:nvSpPr>
-          <p:cNvPr id="6" name="Нижний колонтитул 5"/>
+          <p:cNvPr id="6" name="Footer Placeholder 5"/>
           <p:cNvSpPr>
             <a:spLocks noGrp="1"/>
           </p:cNvSpPr>
@@ -2506,7 +2766,17 @@
         <p:spPr/>
         <p:txBody>
           <a:bodyPr/>
-          <a:lstStyle/>
+          <a:lstStyle>
+            <a:lvl1pPr>
+              <a:defRPr>
+                <a:solidFill>
+                  <a:srgbClr val="FFFFFF">
+                    <a:alpha val="75000"/>
+                  </a:srgbClr>
+                </a:solidFill>
+              </a:defRPr>
+            </a:lvl1pPr>
+          </a:lstStyle>
           <a:p>
             <a:endParaRPr lang="ru-RU"/>
           </a:p>
@@ -2514,7 +2784,7 @@
       </p:sp>
       <p:sp>
         <p:nvSpPr>
-          <p:cNvPr id="7" name="Номер слайда 6"/>
+          <p:cNvPr id="7" name="Slide Number Placeholder 6"/>
           <p:cNvSpPr>
             <a:spLocks noGrp="1"/>
           </p:cNvSpPr>
@@ -2525,7 +2795,17 @@
         <p:spPr/>
         <p:txBody>
           <a:bodyPr/>
-          <a:lstStyle/>
+          <a:lstStyle>
+            <a:lvl1pPr>
+              <a:defRPr>
+                <a:solidFill>
+                  <a:srgbClr val="FFFFFF">
+                    <a:alpha val="20000"/>
+                  </a:srgbClr>
+                </a:solidFill>
+              </a:defRPr>
+            </a:lvl1pPr>
+          </a:lstStyle>
           <a:p>
             <a:fld id="{59BD4EE7-3A0D-47BA-A1CD-76BAC7DE5E02}" type="slidenum">
               <a:rPr lang="ru-RU" smtClean="0"/>
@@ -2536,9 +2816,14 @@
         </p:txBody>
       </p:sp>
     </p:spTree>
+    <p:extLst>
+      <p:ext uri="{BB962C8B-B14F-4D97-AF65-F5344CB8AC3E}">
+        <p14:creationId xmlns:p14="http://schemas.microsoft.com/office/powerpoint/2010/main" val="4269134244"/>
+      </p:ext>
+    </p:extLst>
   </p:cSld>
   <p:clrMapOvr>
-    <a:masterClrMapping/>
+    <a:overrideClrMapping bg1="dk1" tx1="lt1" bg2="dk2" tx2="lt2" accent1="accent1" accent2="accent2" accent3="accent3" accent4="accent4" accent5="accent5" accent6="accent6" hlink="hlink" folHlink="folHlink"/>
   </p:clrMapOvr>
 </p:sldLayout>
 </file>
@@ -2567,7 +2852,7 @@
       </p:grpSpPr>
       <p:sp>
         <p:nvSpPr>
-          <p:cNvPr id="2" name="Заголовок 1"/>
+          <p:cNvPr id="2" name="Title Placeholder 1"/>
           <p:cNvSpPr>
             <a:spLocks noGrp="1"/>
           </p:cNvSpPr>
@@ -2577,8 +2862,8 @@
         </p:nvSpPr>
         <p:spPr>
           <a:xfrm>
-            <a:off x="457200" y="274638"/>
-            <a:ext cx="8229600" cy="1143000"/>
+            <a:off x="492919" y="499533"/>
+            <a:ext cx="8079581" cy="1658198"/>
           </a:xfrm>
           <a:prstGeom prst="rect">
             <a:avLst/>
@@ -2594,13 +2879,13 @@
               <a:rPr lang="ru-RU" smtClean="0"/>
               <a:t>Образец заголовка</a:t>
             </a:r>
-            <a:endParaRPr lang="ru-RU"/>
-          </a:p>
-        </p:txBody>
-      </p:sp>
-      <p:sp>
-        <p:nvSpPr>
-          <p:cNvPr id="3" name="Текст 2"/>
+            <a:endParaRPr lang="en-US" dirty="0"/>
+          </a:p>
+        </p:txBody>
+      </p:sp>
+      <p:sp>
+        <p:nvSpPr>
+          <p:cNvPr id="3" name="Text Placeholder 2"/>
           <p:cNvSpPr>
             <a:spLocks noGrp="1"/>
           </p:cNvSpPr>
@@ -2610,8 +2895,8 @@
         </p:nvSpPr>
         <p:spPr>
           <a:xfrm>
-            <a:off x="457200" y="1600200"/>
-            <a:ext cx="8229600" cy="4525963"/>
+            <a:off x="507206" y="1993393"/>
+            <a:ext cx="8065294" cy="3766185"/>
           </a:xfrm>
           <a:prstGeom prst="rect">
             <a:avLst/>
@@ -2656,13 +2941,13 @@
               <a:rPr lang="ru-RU" smtClean="0"/>
               <a:t>Пятый уровень</a:t>
             </a:r>
-            <a:endParaRPr lang="ru-RU"/>
-          </a:p>
-        </p:txBody>
-      </p:sp>
-      <p:sp>
-        <p:nvSpPr>
-          <p:cNvPr id="4" name="Дата 3"/>
+            <a:endParaRPr lang="en-US" dirty="0"/>
+          </a:p>
+        </p:txBody>
+      </p:sp>
+      <p:sp>
+        <p:nvSpPr>
+          <p:cNvPr id="4" name="Date Placeholder 3"/>
           <p:cNvSpPr>
             <a:spLocks noGrp="1"/>
           </p:cNvSpPr>
@@ -2672,8 +2957,8 @@
         </p:nvSpPr>
         <p:spPr>
           <a:xfrm>
-            <a:off x="457200" y="6356350"/>
-            <a:ext cx="2133600" cy="365125"/>
+            <a:off x="514350" y="6412447"/>
+            <a:ext cx="3086100" cy="228600"/>
           </a:xfrm>
           <a:prstGeom prst="rect">
             <a:avLst/>
@@ -2683,10 +2968,10 @@
           <a:bodyPr vert="horz" lIns="91440" tIns="45720" rIns="91440" bIns="45720" rtlCol="0" anchor="ctr"/>
           <a:lstStyle>
             <a:lvl1pPr algn="l">
-              <a:defRPr sz="1200">
+              <a:defRPr sz="950">
                 <a:solidFill>
                   <a:schemeClr val="tx1">
-                    <a:tint val="75000"/>
+                    <a:alpha val="75000"/>
                   </a:schemeClr>
                 </a:solidFill>
               </a:defRPr>
@@ -2695,7 +2980,7 @@
           <a:p>
             <a:fld id="{81F02B84-2724-4998-9FA1-23616E67724A}" type="datetimeFigureOut">
               <a:rPr lang="ru-RU" smtClean="0"/>
-              <a:t>17.10.2016</a:t>
+              <a:t>19.10.2016</a:t>
             </a:fld>
             <a:endParaRPr lang="ru-RU"/>
           </a:p>
@@ -2703,7 +2988,7 @@
       </p:sp>
       <p:sp>
         <p:nvSpPr>
-          <p:cNvPr id="5" name="Нижний колонтитул 4"/>
+          <p:cNvPr id="5" name="Footer Placeholder 4"/>
           <p:cNvSpPr>
             <a:spLocks noGrp="1"/>
           </p:cNvSpPr>
@@ -2713,8 +2998,8 @@
         </p:nvSpPr>
         <p:spPr>
           <a:xfrm>
-            <a:off x="3124200" y="6356350"/>
-            <a:ext cx="2895600" cy="365125"/>
+            <a:off x="514350" y="6554697"/>
+            <a:ext cx="3771900" cy="228600"/>
           </a:xfrm>
           <a:prstGeom prst="rect">
             <a:avLst/>
@@ -2723,11 +3008,11 @@
         <p:txBody>
           <a:bodyPr vert="horz" lIns="91440" tIns="45720" rIns="91440" bIns="45720" rtlCol="0" anchor="ctr"/>
           <a:lstStyle>
-            <a:lvl1pPr algn="ctr">
-              <a:defRPr sz="1200">
+            <a:lvl1pPr algn="l">
+              <a:defRPr sz="950" cap="all" baseline="0">
                 <a:solidFill>
                   <a:schemeClr val="tx1">
-                    <a:tint val="75000"/>
+                    <a:alpha val="75000"/>
                   </a:schemeClr>
                 </a:solidFill>
               </a:defRPr>
@@ -2740,7 +3025,7 @@
       </p:sp>
       <p:sp>
         <p:nvSpPr>
-          <p:cNvPr id="6" name="Номер слайда 5"/>
+          <p:cNvPr id="6" name="Slide Number Placeholder 5"/>
           <p:cNvSpPr>
             <a:spLocks noGrp="1"/>
           </p:cNvSpPr>
@@ -2750,23 +3035,27 @@
         </p:nvSpPr>
         <p:spPr>
           <a:xfrm>
-            <a:off x="6553200" y="6356350"/>
-            <a:ext cx="2133600" cy="365125"/>
+            <a:off x="6541193" y="5829748"/>
+            <a:ext cx="2194560" cy="1397039"/>
           </a:xfrm>
           <a:prstGeom prst="rect">
             <a:avLst/>
           </a:prstGeom>
         </p:spPr>
         <p:txBody>
-          <a:bodyPr vert="horz" lIns="91440" tIns="45720" rIns="91440" bIns="45720" rtlCol="0" anchor="ctr"/>
+          <a:bodyPr vert="horz" lIns="91440" tIns="45720" rIns="91440" bIns="45720" rtlCol="0" anchor="b"/>
           <a:lstStyle>
             <a:lvl1pPr algn="r">
-              <a:defRPr sz="1200">
+              <a:defRPr sz="9000" b="0">
+                <a:ln>
+                  <a:noFill/>
+                </a:ln>
                 <a:solidFill>
-                  <a:schemeClr val="tx1">
-                    <a:tint val="75000"/>
+                  <a:schemeClr val="accent1">
+                    <a:alpha val="20000"/>
                   </a:schemeClr>
                 </a:solidFill>
+                <a:latin typeface="+mj-lt"/>
               </a:defRPr>
             </a:lvl1pPr>
           </a:lstStyle>
@@ -2780,31 +3069,39 @@
         </p:txBody>
       </p:sp>
     </p:spTree>
+    <p:extLst>
+      <p:ext uri="{BB962C8B-B14F-4D97-AF65-F5344CB8AC3E}">
+        <p14:creationId xmlns:p14="http://schemas.microsoft.com/office/powerpoint/2010/main" val="2435462770"/>
+      </p:ext>
+    </p:extLst>
   </p:cSld>
   <p:clrMap bg1="lt1" tx1="dk1" bg2="lt2" tx2="dk2" accent1="accent1" accent2="accent2" accent3="accent3" accent4="accent4" accent5="accent5" accent6="accent6" hlink="hlink" folHlink="folHlink"/>
   <p:sldLayoutIdLst>
-    <p:sldLayoutId id="2147483649" r:id="rId1"/>
-    <p:sldLayoutId id="2147483650" r:id="rId2"/>
-    <p:sldLayoutId id="2147483651" r:id="rId3"/>
-    <p:sldLayoutId id="2147483652" r:id="rId4"/>
-    <p:sldLayoutId id="2147483653" r:id="rId5"/>
-    <p:sldLayoutId id="2147483654" r:id="rId6"/>
-    <p:sldLayoutId id="2147483655" r:id="rId7"/>
-    <p:sldLayoutId id="2147483656" r:id="rId8"/>
-    <p:sldLayoutId id="2147483657" r:id="rId9"/>
-    <p:sldLayoutId id="2147483658" r:id="rId10"/>
-    <p:sldLayoutId id="2147483659" r:id="rId11"/>
+    <p:sldLayoutId id="2147483691" r:id="rId1"/>
+    <p:sldLayoutId id="2147483692" r:id="rId2"/>
+    <p:sldLayoutId id="2147483693" r:id="rId3"/>
+    <p:sldLayoutId id="2147483694" r:id="rId4"/>
+    <p:sldLayoutId id="2147483695" r:id="rId5"/>
+    <p:sldLayoutId id="2147483696" r:id="rId6"/>
+    <p:sldLayoutId id="2147483697" r:id="rId7"/>
+    <p:sldLayoutId id="2147483698" r:id="rId8"/>
+    <p:sldLayoutId id="2147483699" r:id="rId9"/>
+    <p:sldLayoutId id="2147483700" r:id="rId10"/>
+    <p:sldLayoutId id="2147483701" r:id="rId11"/>
   </p:sldLayoutIdLst>
   <p:txStyles>
     <p:titleStyle>
-      <a:lvl1pPr algn="ctr" defTabSz="914400" rtl="0" eaLnBrk="1" latinLnBrk="0" hangingPunct="1">
+      <a:lvl1pPr algn="l" defTabSz="914400" rtl="0" eaLnBrk="1" latinLnBrk="0" hangingPunct="1">
+        <a:lnSpc>
+          <a:spcPct val="90000"/>
+        </a:lnSpc>
         <a:spcBef>
           <a:spcPct val="0"/>
         </a:spcBef>
         <a:buNone/>
-        <a:defRPr sz="4400" kern="1200">
+        <a:defRPr sz="4800" kern="1200" spc="-120" baseline="0">
           <a:solidFill>
-            <a:schemeClr val="tx1"/>
+            <a:schemeClr val="accent1"/>
           </a:solidFill>
           <a:latin typeface="+mj-lt"/>
           <a:ea typeface="+mj-ea"/>
@@ -2813,135 +3110,189 @@
       </a:lvl1pPr>
     </p:titleStyle>
     <p:bodyStyle>
-      <a:lvl1pPr marL="342900" indent="-342900" algn="l" defTabSz="914400" rtl="0" eaLnBrk="1" latinLnBrk="0" hangingPunct="1">
+      <a:lvl1pPr marL="91440" indent="-91440" algn="l" defTabSz="914400" rtl="0" eaLnBrk="1" latinLnBrk="0" hangingPunct="1">
+        <a:lnSpc>
+          <a:spcPct val="85000"/>
+        </a:lnSpc>
         <a:spcBef>
-          <a:spcPct val="20000"/>
+          <a:spcPts val="1300"/>
         </a:spcBef>
         <a:buFont typeface="Arial" pitchFamily="34" charset="0"/>
-        <a:buChar char="•"/>
-        <a:defRPr sz="3200" kern="1200">
+        <a:buChar char=" "/>
+        <a:defRPr sz="2400" kern="1200">
           <a:solidFill>
-            <a:schemeClr val="tx1"/>
+            <a:schemeClr val="tx1">
+              <a:lumMod val="85000"/>
+              <a:lumOff val="15000"/>
+            </a:schemeClr>
           </a:solidFill>
           <a:latin typeface="+mn-lt"/>
           <a:ea typeface="+mn-ea"/>
           <a:cs typeface="+mn-cs"/>
         </a:defRPr>
       </a:lvl1pPr>
-      <a:lvl2pPr marL="742950" indent="-285750" algn="l" defTabSz="914400" rtl="0" eaLnBrk="1" latinLnBrk="0" hangingPunct="1">
+      <a:lvl2pPr marL="274320" indent="-342900" algn="l" defTabSz="914400" rtl="0" eaLnBrk="1" latinLnBrk="0" hangingPunct="1">
+        <a:lnSpc>
+          <a:spcPct val="85000"/>
+        </a:lnSpc>
         <a:spcBef>
-          <a:spcPct val="20000"/>
+          <a:spcPts val="600"/>
         </a:spcBef>
         <a:buFont typeface="Arial" pitchFamily="34" charset="0"/>
-        <a:buChar char="–"/>
-        <a:defRPr sz="2800" kern="1200">
+        <a:buChar char=" "/>
+        <a:defRPr sz="2400" kern="1200">
           <a:solidFill>
-            <a:schemeClr val="tx1"/>
+            <a:schemeClr val="tx1">
+              <a:lumMod val="85000"/>
+              <a:lumOff val="15000"/>
+            </a:schemeClr>
           </a:solidFill>
           <a:latin typeface="+mn-lt"/>
           <a:ea typeface="+mn-ea"/>
           <a:cs typeface="+mn-cs"/>
         </a:defRPr>
       </a:lvl2pPr>
-      <a:lvl3pPr marL="1143000" indent="-228600" algn="l" defTabSz="914400" rtl="0" eaLnBrk="1" latinLnBrk="0" hangingPunct="1">
+      <a:lvl3pPr marL="548640" indent="-548640" algn="l" defTabSz="914400" rtl="0" eaLnBrk="1" latinLnBrk="0" hangingPunct="1">
+        <a:lnSpc>
+          <a:spcPct val="85000"/>
+        </a:lnSpc>
         <a:spcBef>
-          <a:spcPct val="20000"/>
+          <a:spcPts val="600"/>
         </a:spcBef>
         <a:buFont typeface="Arial" pitchFamily="34" charset="0"/>
-        <a:buChar char="•"/>
-        <a:defRPr sz="2400" kern="1200">
+        <a:buChar char=" "/>
+        <a:defRPr sz="2000" i="1" kern="1200">
           <a:solidFill>
-            <a:schemeClr val="tx1"/>
+            <a:schemeClr val="tx1">
+              <a:lumMod val="85000"/>
+              <a:lumOff val="15000"/>
+            </a:schemeClr>
           </a:solidFill>
           <a:latin typeface="+mn-lt"/>
           <a:ea typeface="+mn-ea"/>
           <a:cs typeface="+mn-cs"/>
         </a:defRPr>
       </a:lvl3pPr>
-      <a:lvl4pPr marL="1600200" indent="-228600" algn="l" defTabSz="914400" rtl="0" eaLnBrk="1" latinLnBrk="0" hangingPunct="1">
+      <a:lvl4pPr marL="822960" indent="-822960" algn="l" defTabSz="914400" rtl="0" eaLnBrk="1" latinLnBrk="0" hangingPunct="1">
+        <a:lnSpc>
+          <a:spcPct val="85000"/>
+        </a:lnSpc>
         <a:spcBef>
-          <a:spcPct val="20000"/>
+          <a:spcPts val="600"/>
         </a:spcBef>
         <a:buFont typeface="Arial" pitchFamily="34" charset="0"/>
-        <a:buChar char="–"/>
-        <a:defRPr sz="2000" kern="1200">
+        <a:buChar char=" "/>
+        <a:defRPr sz="1800" kern="1200">
           <a:solidFill>
-            <a:schemeClr val="tx1"/>
+            <a:schemeClr val="tx1">
+              <a:lumMod val="85000"/>
+              <a:lumOff val="15000"/>
+            </a:schemeClr>
           </a:solidFill>
           <a:latin typeface="+mn-lt"/>
           <a:ea typeface="+mn-ea"/>
           <a:cs typeface="+mn-cs"/>
         </a:defRPr>
       </a:lvl4pPr>
-      <a:lvl5pPr marL="2057400" indent="-228600" algn="l" defTabSz="914400" rtl="0" eaLnBrk="1" latinLnBrk="0" hangingPunct="1">
+      <a:lvl5pPr marL="1097280" indent="-1097280" algn="l" defTabSz="914400" rtl="0" eaLnBrk="1" latinLnBrk="0" hangingPunct="1">
+        <a:lnSpc>
+          <a:spcPct val="85000"/>
+        </a:lnSpc>
         <a:spcBef>
-          <a:spcPct val="20000"/>
+          <a:spcPts val="600"/>
         </a:spcBef>
         <a:buFont typeface="Arial" pitchFamily="34" charset="0"/>
-        <a:buChar char="»"/>
-        <a:defRPr sz="2000" kern="1200">
+        <a:buChar char=" "/>
+        <a:defRPr sz="1800" kern="1200">
           <a:solidFill>
-            <a:schemeClr val="tx1"/>
+            <a:schemeClr val="tx1">
+              <a:lumMod val="85000"/>
+              <a:lumOff val="15000"/>
+            </a:schemeClr>
           </a:solidFill>
           <a:latin typeface="+mn-lt"/>
           <a:ea typeface="+mn-ea"/>
           <a:cs typeface="+mn-cs"/>
         </a:defRPr>
       </a:lvl5pPr>
-      <a:lvl6pPr marL="2514600" indent="-228600" algn="l" defTabSz="914400" rtl="0" eaLnBrk="1" latinLnBrk="0" hangingPunct="1">
+      <a:lvl6pPr marL="1200000" indent="-228600" algn="l" defTabSz="914400" rtl="0" eaLnBrk="1" latinLnBrk="0" hangingPunct="1">
+        <a:lnSpc>
+          <a:spcPct val="85000"/>
+        </a:lnSpc>
         <a:spcBef>
-          <a:spcPct val="20000"/>
+          <a:spcPts val="600"/>
         </a:spcBef>
         <a:buFont typeface="Arial" pitchFamily="34" charset="0"/>
-        <a:buChar char="•"/>
-        <a:defRPr sz="2000" kern="1200">
+        <a:buChar char=" "/>
+        <a:defRPr sz="1800" kern="1200">
           <a:solidFill>
-            <a:schemeClr val="tx1"/>
+            <a:schemeClr val="tx1">
+              <a:lumMod val="85000"/>
+              <a:lumOff val="15000"/>
+            </a:schemeClr>
           </a:solidFill>
           <a:latin typeface="+mn-lt"/>
           <a:ea typeface="+mn-ea"/>
           <a:cs typeface="+mn-cs"/>
         </a:defRPr>
       </a:lvl6pPr>
-      <a:lvl7pPr marL="2971800" indent="-228600" algn="l" defTabSz="914400" rtl="0" eaLnBrk="1" latinLnBrk="0" hangingPunct="1">
+      <a:lvl7pPr marL="1400000" indent="-228600" algn="l" defTabSz="914400" rtl="0" eaLnBrk="1" latinLnBrk="0" hangingPunct="1">
+        <a:lnSpc>
+          <a:spcPct val="85000"/>
+        </a:lnSpc>
         <a:spcBef>
-          <a:spcPct val="20000"/>
+          <a:spcPts val="600"/>
         </a:spcBef>
         <a:buFont typeface="Arial" pitchFamily="34" charset="0"/>
-        <a:buChar char="•"/>
-        <a:defRPr sz="2000" kern="1200">
+        <a:buChar char=" "/>
+        <a:defRPr sz="1800" kern="1200">
           <a:solidFill>
-            <a:schemeClr val="tx1"/>
+            <a:schemeClr val="tx1">
+              <a:lumMod val="85000"/>
+              <a:lumOff val="15000"/>
+            </a:schemeClr>
           </a:solidFill>
           <a:latin typeface="+mn-lt"/>
           <a:ea typeface="+mn-ea"/>
           <a:cs typeface="+mn-cs"/>
         </a:defRPr>
       </a:lvl7pPr>
-      <a:lvl8pPr marL="3429000" indent="-228600" algn="l" defTabSz="914400" rtl="0" eaLnBrk="1" latinLnBrk="0" hangingPunct="1">
+      <a:lvl8pPr marL="1600000" indent="-228600" algn="l" defTabSz="914400" rtl="0" eaLnBrk="1" latinLnBrk="0" hangingPunct="1">
+        <a:lnSpc>
+          <a:spcPct val="85000"/>
+        </a:lnSpc>
         <a:spcBef>
-          <a:spcPct val="20000"/>
+          <a:spcPts val="600"/>
         </a:spcBef>
         <a:buFont typeface="Arial" pitchFamily="34" charset="0"/>
-        <a:buChar char="•"/>
-        <a:defRPr sz="2000" kern="1200">
+        <a:buChar char=" "/>
+        <a:defRPr sz="1800" kern="1200">
           <a:solidFill>
-            <a:schemeClr val="tx1"/>
+            <a:schemeClr val="tx1">
+              <a:lumMod val="85000"/>
+              <a:lumOff val="15000"/>
+            </a:schemeClr>
           </a:solidFill>
           <a:latin typeface="+mn-lt"/>
           <a:ea typeface="+mn-ea"/>
           <a:cs typeface="+mn-cs"/>
         </a:defRPr>
       </a:lvl8pPr>
-      <a:lvl9pPr marL="3886200" indent="-228600" algn="l" defTabSz="914400" rtl="0" eaLnBrk="1" latinLnBrk="0" hangingPunct="1">
+      <a:lvl9pPr marL="1800000" indent="-228600" algn="l" defTabSz="914400" rtl="0" eaLnBrk="1" latinLnBrk="0" hangingPunct="1">
+        <a:lnSpc>
+          <a:spcPct val="85000"/>
+        </a:lnSpc>
         <a:spcBef>
-          <a:spcPct val="20000"/>
+          <a:spcPts val="600"/>
         </a:spcBef>
         <a:buFont typeface="Arial" pitchFamily="34" charset="0"/>
-        <a:buChar char="•"/>
-        <a:defRPr sz="2000" kern="1200">
+        <a:buChar char=" "/>
+        <a:defRPr sz="1800" kern="1200">
           <a:solidFill>
-            <a:schemeClr val="tx1"/>
+            <a:schemeClr val="tx1">
+              <a:lumMod val="85000"/>
+              <a:lumOff val="15000"/>
+            </a:schemeClr>
           </a:solidFill>
           <a:latin typeface="+mn-lt"/>
           <a:ea typeface="+mn-ea"/>
@@ -2951,7 +3302,7 @@
     </p:bodyStyle>
     <p:otherStyle>
       <a:defPPr>
-        <a:defRPr lang="ru-RU"/>
+        <a:defRPr lang="en-US"/>
       </a:defPPr>
       <a:lvl1pPr marL="0" algn="l" defTabSz="914400" rtl="0" eaLnBrk="1" latinLnBrk="0" hangingPunct="1">
         <a:defRPr sz="1800" kern="1200">
@@ -3106,7 +3457,7 @@
         </p:spPr>
         <p:txBody>
           <a:bodyPr>
-            <a:normAutofit fontScale="92500" lnSpcReduction="10000"/>
+            <a:normAutofit/>
           </a:bodyPr>
           <a:lstStyle/>
           <a:p>
@@ -3294,7 +3645,7 @@
         <p:spPr/>
         <p:txBody>
           <a:bodyPr>
-            <a:normAutofit fontScale="85000" lnSpcReduction="10000"/>
+            <a:normAutofit lnSpcReduction="10000"/>
           </a:bodyPr>
           <a:lstStyle/>
           <a:p>
@@ -3448,7 +3799,7 @@
         <p:spPr/>
         <p:txBody>
           <a:bodyPr>
-            <a:normAutofit fontScale="85000" lnSpcReduction="10000"/>
+            <a:normAutofit lnSpcReduction="10000"/>
           </a:bodyPr>
           <a:lstStyle/>
           <a:p>
@@ -3647,15 +3998,14 @@
         </p:nvPicPr>
         <p:blipFill>
           <a:blip r:embed="rId2" cstate="print"/>
-          <a:srcRect/>
           <a:stretch>
             <a:fillRect/>
           </a:stretch>
         </p:blipFill>
         <p:spPr bwMode="auto">
           <a:xfrm>
-            <a:off x="457200" y="1828390"/>
-            <a:ext cx="8229600" cy="4069582"/>
+            <a:off x="732067" y="1993900"/>
+            <a:ext cx="7614778" cy="3765550"/>
           </a:xfrm>
           <a:prstGeom prst="rect">
             <a:avLst/>
@@ -4010,11 +4360,7 @@
           <a:p>
             <a:r>
               <a:rPr lang="en-US" dirty="0" smtClean="0"/>
-              <a:t>A recurrent neural network (RNN) is a class of artificial neural network where connections between units form a directed cycle</a:t>
-            </a:r>
-            <a:r>
-              <a:rPr lang="en-US" dirty="0" smtClean="0"/>
-              <a:t>.</a:t>
+              <a:t>A recurrent neural network (RNN) is a class of artificial neural network where connections between units form a directed cycle.</a:t>
             </a:r>
             <a:endParaRPr lang="ru-RU" dirty="0" smtClean="0"/>
           </a:p>
@@ -4089,7 +4435,12 @@
             <p:ph type="title"/>
           </p:nvPr>
         </p:nvSpPr>
-        <p:spPr/>
+        <p:spPr>
+          <a:xfrm>
+            <a:off x="492919" y="188641"/>
+            <a:ext cx="8079581" cy="792087"/>
+          </a:xfrm>
+        </p:spPr>
         <p:txBody>
           <a:bodyPr/>
           <a:lstStyle/>
@@ -4112,119 +4463,184 @@
             <p:ph idx="1"/>
           </p:nvPr>
         </p:nvSpPr>
-        <p:spPr/>
+        <p:spPr>
+          <a:xfrm>
+            <a:off x="507206" y="980728"/>
+            <a:ext cx="8065294" cy="5877271"/>
+          </a:xfrm>
+        </p:spPr>
         <p:txBody>
           <a:bodyPr>
-            <a:normAutofit fontScale="47500" lnSpcReduction="20000"/>
+            <a:noAutofit/>
           </a:bodyPr>
           <a:lstStyle/>
           <a:p>
             <a:r>
-              <a:rPr lang="en-US" dirty="0" smtClean="0"/>
+              <a:rPr lang="en-US" sz="1400" dirty="0" smtClean="0">
+                <a:latin typeface="Times New Roman" panose="02020603050405020304" pitchFamily="18" charset="0"/>
+                <a:cs typeface="Times New Roman" panose="02020603050405020304" pitchFamily="18" charset="0"/>
+              </a:rPr>
               <a:t>Fully recurrent network</a:t>
             </a:r>
           </a:p>
           <a:p>
             <a:r>
-              <a:rPr lang="en-US" dirty="0" smtClean="0"/>
+              <a:rPr lang="en-US" sz="1400" dirty="0" smtClean="0">
+                <a:latin typeface="Times New Roman" panose="02020603050405020304" pitchFamily="18" charset="0"/>
+                <a:cs typeface="Times New Roman" panose="02020603050405020304" pitchFamily="18" charset="0"/>
+              </a:rPr>
               <a:t>Recursive neural networks</a:t>
             </a:r>
           </a:p>
           <a:p>
             <a:r>
-              <a:rPr lang="en-US" dirty="0" smtClean="0"/>
+              <a:rPr lang="en-US" sz="1400" dirty="0" smtClean="0">
+                <a:latin typeface="Times New Roman" panose="02020603050405020304" pitchFamily="18" charset="0"/>
+                <a:cs typeface="Times New Roman" panose="02020603050405020304" pitchFamily="18" charset="0"/>
+              </a:rPr>
               <a:t>Hopfield network</a:t>
             </a:r>
           </a:p>
           <a:p>
             <a:r>
-              <a:rPr lang="en-US" dirty="0" smtClean="0"/>
+              <a:rPr lang="en-US" sz="1400" dirty="0" smtClean="0">
+                <a:latin typeface="Times New Roman" panose="02020603050405020304" pitchFamily="18" charset="0"/>
+                <a:cs typeface="Times New Roman" panose="02020603050405020304" pitchFamily="18" charset="0"/>
+              </a:rPr>
               <a:t>Elman networks and Jordan networks</a:t>
             </a:r>
           </a:p>
           <a:p>
             <a:r>
-              <a:rPr lang="en-US" dirty="0" smtClean="0"/>
+              <a:rPr lang="en-US" sz="1400" dirty="0" smtClean="0">
+                <a:latin typeface="Times New Roman" panose="02020603050405020304" pitchFamily="18" charset="0"/>
+                <a:cs typeface="Times New Roman" panose="02020603050405020304" pitchFamily="18" charset="0"/>
+              </a:rPr>
               <a:t>Echo state network</a:t>
             </a:r>
           </a:p>
           <a:p>
             <a:r>
-              <a:rPr lang="en-US" dirty="0" smtClean="0"/>
+              <a:rPr lang="en-US" sz="1400" dirty="0" smtClean="0">
+                <a:latin typeface="Times New Roman" panose="02020603050405020304" pitchFamily="18" charset="0"/>
+                <a:cs typeface="Times New Roman" panose="02020603050405020304" pitchFamily="18" charset="0"/>
+              </a:rPr>
               <a:t>Neural history compressor</a:t>
             </a:r>
           </a:p>
           <a:p>
             <a:r>
-              <a:rPr lang="en-US" dirty="0" smtClean="0"/>
+              <a:rPr lang="en-US" sz="1400" dirty="0" smtClean="0">
+                <a:latin typeface="Times New Roman" panose="02020603050405020304" pitchFamily="18" charset="0"/>
+                <a:cs typeface="Times New Roman" panose="02020603050405020304" pitchFamily="18" charset="0"/>
+              </a:rPr>
               <a:t>Long short term memory</a:t>
             </a:r>
           </a:p>
           <a:p>
             <a:r>
-              <a:rPr lang="en-US" dirty="0" smtClean="0"/>
+              <a:rPr lang="en-US" sz="1400" dirty="0" smtClean="0">
+                <a:latin typeface="Times New Roman" panose="02020603050405020304" pitchFamily="18" charset="0"/>
+                <a:cs typeface="Times New Roman" panose="02020603050405020304" pitchFamily="18" charset="0"/>
+              </a:rPr>
               <a:t>Bi-directional RNN</a:t>
             </a:r>
           </a:p>
           <a:p>
             <a:r>
-              <a:rPr lang="en-US" dirty="0" smtClean="0"/>
+              <a:rPr lang="en-US" sz="1400" dirty="0" smtClean="0">
+                <a:latin typeface="Times New Roman" panose="02020603050405020304" pitchFamily="18" charset="0"/>
+                <a:cs typeface="Times New Roman" panose="02020603050405020304" pitchFamily="18" charset="0"/>
+              </a:rPr>
               <a:t>Continuous-time RNN</a:t>
             </a:r>
           </a:p>
           <a:p>
             <a:r>
-              <a:rPr lang="en-US" dirty="0" smtClean="0"/>
+              <a:rPr lang="en-US" sz="1400" dirty="0" smtClean="0">
+                <a:latin typeface="Times New Roman" panose="02020603050405020304" pitchFamily="18" charset="0"/>
+                <a:cs typeface="Times New Roman" panose="02020603050405020304" pitchFamily="18" charset="0"/>
+              </a:rPr>
               <a:t>Hierarchical RNN</a:t>
             </a:r>
           </a:p>
           <a:p>
             <a:r>
-              <a:rPr lang="en-US" dirty="0" smtClean="0"/>
+              <a:rPr lang="en-US" sz="1400" dirty="0" smtClean="0">
+                <a:latin typeface="Times New Roman" panose="02020603050405020304" pitchFamily="18" charset="0"/>
+                <a:cs typeface="Times New Roman" panose="02020603050405020304" pitchFamily="18" charset="0"/>
+              </a:rPr>
               <a:t>Recurrent multilayer </a:t>
             </a:r>
             <a:r>
-              <a:rPr lang="en-US" dirty="0" err="1" smtClean="0"/>
+              <a:rPr lang="en-US" sz="1400" dirty="0" err="1" smtClean="0">
+                <a:latin typeface="Times New Roman" panose="02020603050405020304" pitchFamily="18" charset="0"/>
+                <a:cs typeface="Times New Roman" panose="02020603050405020304" pitchFamily="18" charset="0"/>
+              </a:rPr>
               <a:t>perceptron</a:t>
             </a:r>
-            <a:endParaRPr lang="en-US" dirty="0" smtClean="0"/>
-          </a:p>
-          <a:p>
-            <a:r>
-              <a:rPr lang="en-US" dirty="0" smtClean="0"/>
+            <a:endParaRPr lang="en-US" sz="1400" dirty="0" smtClean="0">
+              <a:latin typeface="Times New Roman" panose="02020603050405020304" pitchFamily="18" charset="0"/>
+              <a:cs typeface="Times New Roman" panose="02020603050405020304" pitchFamily="18" charset="0"/>
+            </a:endParaRPr>
+          </a:p>
+          <a:p>
+            <a:r>
+              <a:rPr lang="en-US" sz="1400" dirty="0" smtClean="0">
+                <a:latin typeface="Times New Roman" panose="02020603050405020304" pitchFamily="18" charset="0"/>
+                <a:cs typeface="Times New Roman" panose="02020603050405020304" pitchFamily="18" charset="0"/>
+              </a:rPr>
               <a:t>Second order RNN</a:t>
             </a:r>
           </a:p>
           <a:p>
             <a:r>
-              <a:rPr lang="en-US" dirty="0" smtClean="0"/>
+              <a:rPr lang="en-US" sz="1400" dirty="0" smtClean="0">
+                <a:latin typeface="Times New Roman" panose="02020603050405020304" pitchFamily="18" charset="0"/>
+                <a:cs typeface="Times New Roman" panose="02020603050405020304" pitchFamily="18" charset="0"/>
+              </a:rPr>
               <a:t>Multiple timescales recurrent neural network (MTRNN) model</a:t>
             </a:r>
           </a:p>
           <a:p>
             <a:r>
-              <a:rPr lang="en-US" dirty="0" smtClean="0"/>
+              <a:rPr lang="en-US" sz="1400" dirty="0" smtClean="0">
+                <a:latin typeface="Times New Roman" panose="02020603050405020304" pitchFamily="18" charset="0"/>
+                <a:cs typeface="Times New Roman" panose="02020603050405020304" pitchFamily="18" charset="0"/>
+              </a:rPr>
               <a:t>Pollack's sequential cascaded networks</a:t>
             </a:r>
           </a:p>
           <a:p>
             <a:r>
-              <a:rPr lang="en-US" dirty="0" smtClean="0"/>
+              <a:rPr lang="en-US" sz="1400" dirty="0" smtClean="0">
+                <a:latin typeface="Times New Roman" panose="02020603050405020304" pitchFamily="18" charset="0"/>
+                <a:cs typeface="Times New Roman" panose="02020603050405020304" pitchFamily="18" charset="0"/>
+              </a:rPr>
               <a:t>Neural Turing Machines</a:t>
             </a:r>
           </a:p>
           <a:p>
             <a:r>
-              <a:rPr lang="en-US" dirty="0" smtClean="0"/>
+              <a:rPr lang="en-US" sz="1400" dirty="0" smtClean="0">
+                <a:latin typeface="Times New Roman" panose="02020603050405020304" pitchFamily="18" charset="0"/>
+                <a:cs typeface="Times New Roman" panose="02020603050405020304" pitchFamily="18" charset="0"/>
+              </a:rPr>
               <a:t>Neural network pushdown automata</a:t>
             </a:r>
           </a:p>
           <a:p>
             <a:r>
-              <a:rPr lang="en-US" dirty="0" smtClean="0"/>
+              <a:rPr lang="en-US" sz="1400" dirty="0" smtClean="0">
+                <a:latin typeface="Times New Roman" panose="02020603050405020304" pitchFamily="18" charset="0"/>
+                <a:cs typeface="Times New Roman" panose="02020603050405020304" pitchFamily="18" charset="0"/>
+              </a:rPr>
               <a:t>Bidirectional associative memory</a:t>
             </a:r>
-            <a:endParaRPr lang="ru-RU" dirty="0"/>
+            <a:endParaRPr lang="ru-RU" sz="1400" dirty="0">
+              <a:latin typeface="Times New Roman" panose="02020603050405020304" pitchFamily="18" charset="0"/>
+              <a:cs typeface="Times New Roman" panose="02020603050405020304" pitchFamily="18" charset="0"/>
+            </a:endParaRPr>
           </a:p>
         </p:txBody>
       </p:sp>
@@ -4233,6 +4649,13 @@
   <p:clrMapOvr>
     <a:masterClrMapping/>
   </p:clrMapOvr>
+  <p:timing>
+    <p:tnLst>
+      <p:par>
+        <p:cTn id="1" dur="indefinite" restart="never" nodeType="tmRoot"/>
+      </p:par>
+    </p:tnLst>
+  </p:timing>
 </p:sld>
 </file>
 
@@ -4419,7 +4842,7 @@
         <p:spPr/>
         <p:txBody>
           <a:bodyPr>
-            <a:normAutofit lnSpcReduction="10000"/>
+            <a:normAutofit/>
           </a:bodyPr>
           <a:lstStyle/>
           <a:p>
@@ -4494,7 +4917,7 @@
         <p:spPr/>
         <p:txBody>
           <a:bodyPr>
-            <a:normAutofit fontScale="92500"/>
+            <a:normAutofit/>
           </a:bodyPr>
           <a:lstStyle/>
           <a:p>
@@ -4588,7 +5011,7 @@
         <p:spPr/>
         <p:txBody>
           <a:bodyPr>
-            <a:normAutofit lnSpcReduction="10000"/>
+            <a:normAutofit/>
           </a:bodyPr>
           <a:lstStyle/>
           <a:p>
@@ -4689,8 +5112,8 @@
         </p:blipFill>
         <p:spPr>
           <a:xfrm>
-            <a:off x="457200" y="0"/>
-            <a:ext cx="8507288" cy="6525344"/>
+            <a:off x="1500981" y="2166937"/>
+            <a:ext cx="6076950" cy="3419475"/>
           </a:xfrm>
         </p:spPr>
       </p:pic>
@@ -4715,9 +5138,9 @@
 </file>
 
 <file path=ppt/theme/theme1.xml><?xml version="1.0" encoding="utf-8"?>
-<a:theme xmlns:a="http://schemas.openxmlformats.org/drawingml/2006/main" name="Тема Office">
+<a:theme xmlns:a="http://schemas.openxmlformats.org/drawingml/2006/main" name="Метрополия">
   <a:themeElements>
-    <a:clrScheme name="Стандартная">
+    <a:clrScheme name="Метрополия">
       <a:dk1>
         <a:sysClr val="windowText" lastClr="000000"/>
       </a:dk1>
@@ -4725,39 +5148,39 @@
         <a:sysClr val="window" lastClr="FFFFFF"/>
       </a:lt1>
       <a:dk2>
-        <a:srgbClr val="1F497D"/>
+        <a:srgbClr val="162F33"/>
       </a:dk2>
       <a:lt2>
-        <a:srgbClr val="EEECE1"/>
+        <a:srgbClr val="EAF0E0"/>
       </a:lt2>
       <a:accent1>
-        <a:srgbClr val="4F81BD"/>
+        <a:srgbClr val="50B4C8"/>
       </a:accent1>
       <a:accent2>
-        <a:srgbClr val="C0504D"/>
+        <a:srgbClr val="A8B97F"/>
       </a:accent2>
       <a:accent3>
-        <a:srgbClr val="9BBB59"/>
+        <a:srgbClr val="9B9256"/>
       </a:accent3>
       <a:accent4>
-        <a:srgbClr val="8064A2"/>
+        <a:srgbClr val="657689"/>
       </a:accent4>
       <a:accent5>
-        <a:srgbClr val="4BACC6"/>
+        <a:srgbClr val="7A855D"/>
       </a:accent5>
       <a:accent6>
-        <a:srgbClr val="F79646"/>
+        <a:srgbClr val="84AC9D"/>
       </a:accent6>
       <a:hlink>
-        <a:srgbClr val="0000FF"/>
+        <a:srgbClr val="2370CD"/>
       </a:hlink>
       <a:folHlink>
-        <a:srgbClr val="800080"/>
+        <a:srgbClr val="877589"/>
       </a:folHlink>
     </a:clrScheme>
-    <a:fontScheme name="Стандартная">
+    <a:fontScheme name="Метрополия">
       <a:majorFont>
-        <a:latin typeface="Calibri"/>
+        <a:latin typeface="Calibri Light" panose="020F0302020204030204"/>
         <a:ea typeface=""/>
         <a:cs typeface=""/>
         <a:font script="Jpan" typeface="ＭＳ Ｐゴシック"/>
@@ -4789,22 +5212,23 @@
         <a:font script="Mong" typeface="Mongolian Baiti"/>
         <a:font script="Viet" typeface="Times New Roman"/>
         <a:font script="Uigh" typeface="Microsoft Uighur"/>
+        <a:font script="Geor" typeface="Sylfaen"/>
       </a:majorFont>
       <a:minorFont>
-        <a:latin typeface="Calibri"/>
+        <a:latin typeface="Calibri Light" panose="020F0302020204030204"/>
         <a:ea typeface=""/>
         <a:cs typeface=""/>
         <a:font script="Jpan" typeface="ＭＳ Ｐゴシック"/>
         <a:font script="Hang" typeface="맑은 고딕"/>
         <a:font script="Hans" typeface="宋体"/>
         <a:font script="Hant" typeface="新細明體"/>
-        <a:font script="Arab" typeface="Arial"/>
-        <a:font script="Hebr" typeface="Arial"/>
-        <a:font script="Thai" typeface="Cordia New"/>
+        <a:font script="Arab" typeface="Times New Roman"/>
+        <a:font script="Hebr" typeface="Times New Roman"/>
+        <a:font script="Thai" typeface="Angsana New"/>
         <a:font script="Ethi" typeface="Nyala"/>
         <a:font script="Beng" typeface="Vrinda"/>
         <a:font script="Gujr" typeface="Shruti"/>
-        <a:font script="Khmr" typeface="DaunPenh"/>
+        <a:font script="Khmr" typeface="MoolBoran"/>
         <a:font script="Knda" typeface="Tunga"/>
         <a:font script="Guru" typeface="Raavi"/>
         <a:font script="Cans" typeface="Euphemia"/>
@@ -4821,11 +5245,12 @@
         <a:font script="Laoo" typeface="DokChampa"/>
         <a:font script="Sinh" typeface="Iskoola Pota"/>
         <a:font script="Mong" typeface="Mongolian Baiti"/>
-        <a:font script="Viet" typeface="Arial"/>
+        <a:font script="Viet" typeface="Times New Roman"/>
         <a:font script="Uigh" typeface="Microsoft Uighur"/>
+        <a:font script="Geor" typeface="Sylfaen"/>
       </a:minorFont>
     </a:fontScheme>
-    <a:fmtScheme name="Стандартная">
+    <a:fmtScheme name="Метрополия">
       <a:fillStyleLst>
         <a:solidFill>
           <a:schemeClr val="phClr"/>
@@ -4834,66 +5259,69 @@
           <a:gsLst>
             <a:gs pos="0">
               <a:schemeClr val="phClr">
-                <a:tint val="50000"/>
-                <a:satMod val="300000"/>
+                <a:tint val="70000"/>
+                <a:satMod val="100000"/>
+                <a:lumMod val="110000"/>
               </a:schemeClr>
             </a:gs>
-            <a:gs pos="35000">
+            <a:gs pos="50000">
               <a:schemeClr val="phClr">
-                <a:tint val="37000"/>
-                <a:satMod val="300000"/>
+                <a:tint val="75000"/>
+                <a:satMod val="101000"/>
+                <a:lumMod val="105000"/>
               </a:schemeClr>
             </a:gs>
             <a:gs pos="100000">
               <a:schemeClr val="phClr">
-                <a:tint val="15000"/>
-                <a:satMod val="350000"/>
+                <a:tint val="82000"/>
+                <a:satMod val="104000"/>
+                <a:lumMod val="105000"/>
               </a:schemeClr>
             </a:gs>
           </a:gsLst>
-          <a:lin ang="16200000" scaled="1"/>
+          <a:lin ang="2700000" scaled="0"/>
         </a:gradFill>
         <a:gradFill rotWithShape="1">
           <a:gsLst>
             <a:gs pos="0">
               <a:schemeClr val="phClr">
-                <a:shade val="51000"/>
-                <a:satMod val="130000"/>
+                <a:tint val="97000"/>
+                <a:satMod val="100000"/>
+                <a:lumMod val="102000"/>
               </a:schemeClr>
             </a:gs>
-            <a:gs pos="80000">
+            <a:gs pos="50000">
               <a:schemeClr val="phClr">
-                <a:shade val="93000"/>
-                <a:satMod val="130000"/>
+                <a:shade val="100000"/>
+                <a:satMod val="100000"/>
+                <a:lumMod val="100000"/>
               </a:schemeClr>
             </a:gs>
             <a:gs pos="100000">
               <a:schemeClr val="phClr">
-                <a:shade val="94000"/>
-                <a:satMod val="135000"/>
+                <a:shade val="80000"/>
+                <a:satMod val="100000"/>
+                <a:lumMod val="99000"/>
               </a:schemeClr>
             </a:gs>
           </a:gsLst>
-          <a:lin ang="16200000" scaled="0"/>
+          <a:lin ang="2700000" scaled="0"/>
         </a:gradFill>
       </a:fillStyleLst>
       <a:lnStyleLst>
         <a:ln w="9525" cap="flat" cmpd="sng" algn="ctr">
           <a:solidFill>
-            <a:schemeClr val="phClr">
-              <a:shade val="95000"/>
-              <a:satMod val="105000"/>
-            </a:schemeClr>
+            <a:schemeClr val="phClr"/>
           </a:solidFill>
           <a:prstDash val="solid"/>
         </a:ln>
-        <a:ln w="25400" cap="flat" cmpd="sng" algn="ctr">
+        <a:ln w="12700" cap="flat" cmpd="sng" algn="ctr">
           <a:solidFill>
             <a:schemeClr val="phClr"/>
           </a:solidFill>
           <a:prstDash val="solid"/>
         </a:ln>
-        <a:ln w="38100" cap="flat" cmpd="sng" algn="ctr">
+        <a:ln w="19050" cap="flat" cmpd="sng" algn="ctr">
           <a:solidFill>
             <a:schemeClr val="phClr"/>
           </a:solidFill>
@@ -4902,97 +5330,46 @@
       </a:lnStyleLst>
       <a:effectStyleLst>
         <a:effectStyle>
+          <a:effectLst/>
+        </a:effectStyle>
+        <a:effectStyle>
+          <a:effectLst/>
+        </a:effectStyle>
+        <a:effectStyle>
           <a:effectLst>
-            <a:outerShdw blurRad="40000" dist="20000" dir="5400000" rotWithShape="0">
+            <a:outerShdw blurRad="57150" dist="19050" dir="5400000" algn="ctr" rotWithShape="0">
               <a:srgbClr val="000000">
-                <a:alpha val="38000"/>
+                <a:alpha val="63000"/>
               </a:srgbClr>
             </a:outerShdw>
           </a:effectLst>
-        </a:effectStyle>
-        <a:effectStyle>
-          <a:effectLst>
-            <a:outerShdw blurRad="40000" dist="23000" dir="5400000" rotWithShape="0">
-              <a:srgbClr val="000000">
-                <a:alpha val="35000"/>
-              </a:srgbClr>
-            </a:outerShdw>
-          </a:effectLst>
-        </a:effectStyle>
-        <a:effectStyle>
-          <a:effectLst>
-            <a:outerShdw blurRad="40000" dist="23000" dir="5400000" rotWithShape="0">
-              <a:srgbClr val="000000">
-                <a:alpha val="35000"/>
-              </a:srgbClr>
-            </a:outerShdw>
-          </a:effectLst>
-          <a:scene3d>
-            <a:camera prst="orthographicFront">
-              <a:rot lat="0" lon="0" rev="0"/>
-            </a:camera>
-            <a:lightRig rig="threePt" dir="t">
-              <a:rot lat="0" lon="0" rev="1200000"/>
-            </a:lightRig>
-          </a:scene3d>
-          <a:sp3d>
-            <a:bevelT w="63500" h="25400"/>
-          </a:sp3d>
         </a:effectStyle>
       </a:effectStyleLst>
       <a:bgFillStyleLst>
         <a:solidFill>
           <a:schemeClr val="phClr"/>
         </a:solidFill>
-        <a:gradFill rotWithShape="1">
-          <a:gsLst>
-            <a:gs pos="0">
-              <a:schemeClr val="phClr">
-                <a:tint val="40000"/>
-                <a:satMod val="350000"/>
-              </a:schemeClr>
-            </a:gs>
-            <a:gs pos="40000">
-              <a:schemeClr val="phClr">
-                <a:tint val="45000"/>
-                <a:shade val="99000"/>
-                <a:satMod val="350000"/>
-              </a:schemeClr>
-            </a:gs>
-            <a:gs pos="100000">
-              <a:schemeClr val="phClr">
-                <a:shade val="20000"/>
-                <a:satMod val="255000"/>
-              </a:schemeClr>
-            </a:gs>
-          </a:gsLst>
-          <a:path path="circle">
-            <a:fillToRect l="50000" t="-80000" r="50000" b="180000"/>
-          </a:path>
-        </a:gradFill>
-        <a:gradFill rotWithShape="1">
-          <a:gsLst>
-            <a:gs pos="0">
-              <a:schemeClr val="phClr">
-                <a:tint val="80000"/>
-                <a:satMod val="300000"/>
-              </a:schemeClr>
-            </a:gs>
-            <a:gs pos="100000">
-              <a:schemeClr val="phClr">
-                <a:shade val="30000"/>
-                <a:satMod val="200000"/>
-              </a:schemeClr>
-            </a:gs>
-          </a:gsLst>
-          <a:path path="circle">
-            <a:fillToRect l="50000" t="50000" r="50000" b="50000"/>
-          </a:path>
-        </a:gradFill>
+        <a:solidFill>
+          <a:schemeClr val="phClr">
+            <a:tint val="95000"/>
+            <a:satMod val="170000"/>
+          </a:schemeClr>
+        </a:solidFill>
+        <a:solidFill>
+          <a:schemeClr val="phClr">
+            <a:shade val="95000"/>
+            <a:satMod val="170000"/>
+          </a:schemeClr>
+        </a:solidFill>
       </a:bgFillStyleLst>
     </a:fmtScheme>
   </a:themeElements>
   <a:objectDefaults/>
   <a:extraClrSchemeLst/>
+  <a:extLst>
+    <a:ext uri="{05A4C25C-085E-4340-85A3-A5531E510DB2}">
+      <thm15:themeFamily xmlns:thm15="http://schemas.microsoft.com/office/thememl/2012/main" name="Metropolitan" id="{4C5440D6-04D2-4954-96CF-F251137069B2}" vid="{79CFCA13-9412-4290-BB4B-85112F88857B}"/>
+    </a:ext>
+  </a:extLst>
 </a:theme>
 </file>
</xml_diff>